<commit_message>
Adds singley linked list
</commit_message>
<xml_diff>
--- a/Marks Drawrings.pptx
+++ b/Marks Drawrings.pptx
@@ -7,6 +7,7 @@
   <p:sldIdLst>
     <p:sldId id="256" r:id="rId2"/>
     <p:sldId id="257" r:id="rId3"/>
+    <p:sldId id="258" r:id="rId4"/>
   </p:sldIdLst>
   <p:sldSz cx="12192000" cy="6858000"/>
   <p:notesSz cx="6858000" cy="9144000"/>
@@ -105,6 +106,11 @@
       </a:defRPr>
     </a:lvl9pPr>
   </p:defaultTextStyle>
+  <p:extLst>
+    <p:ext uri="{EFAFB233-063F-42B5-8137-9DF3F51BA10A}">
+      <p15:sldGuideLst xmlns:p15="http://schemas.microsoft.com/office/powerpoint/2012/main"/>
+    </p:ext>
+  </p:extLst>
 </p:presentation>
 </file>
 
@@ -255,7 +261,7 @@
           <a:p>
             <a:fld id="{5D0E3E9C-DB1F-4A1E-AAB4-85CBF81E55B3}" type="datetimeFigureOut">
               <a:rPr lang="en-US" smtClean="0"/>
-              <a:t>5/8/2023</a:t>
+              <a:t>5/9/2023</a:t>
             </a:fld>
             <a:endParaRPr lang="en-US"/>
           </a:p>
@@ -453,7 +459,7 @@
           <a:p>
             <a:fld id="{5D0E3E9C-DB1F-4A1E-AAB4-85CBF81E55B3}" type="datetimeFigureOut">
               <a:rPr lang="en-US" smtClean="0"/>
-              <a:t>5/8/2023</a:t>
+              <a:t>5/9/2023</a:t>
             </a:fld>
             <a:endParaRPr lang="en-US"/>
           </a:p>
@@ -661,7 +667,7 @@
           <a:p>
             <a:fld id="{5D0E3E9C-DB1F-4A1E-AAB4-85CBF81E55B3}" type="datetimeFigureOut">
               <a:rPr lang="en-US" smtClean="0"/>
-              <a:t>5/8/2023</a:t>
+              <a:t>5/9/2023</a:t>
             </a:fld>
             <a:endParaRPr lang="en-US"/>
           </a:p>
@@ -859,7 +865,7 @@
           <a:p>
             <a:fld id="{5D0E3E9C-DB1F-4A1E-AAB4-85CBF81E55B3}" type="datetimeFigureOut">
               <a:rPr lang="en-US" smtClean="0"/>
-              <a:t>5/8/2023</a:t>
+              <a:t>5/9/2023</a:t>
             </a:fld>
             <a:endParaRPr lang="en-US"/>
           </a:p>
@@ -1134,7 +1140,7 @@
           <a:p>
             <a:fld id="{5D0E3E9C-DB1F-4A1E-AAB4-85CBF81E55B3}" type="datetimeFigureOut">
               <a:rPr lang="en-US" smtClean="0"/>
-              <a:t>5/8/2023</a:t>
+              <a:t>5/9/2023</a:t>
             </a:fld>
             <a:endParaRPr lang="en-US"/>
           </a:p>
@@ -1399,7 +1405,7 @@
           <a:p>
             <a:fld id="{5D0E3E9C-DB1F-4A1E-AAB4-85CBF81E55B3}" type="datetimeFigureOut">
               <a:rPr lang="en-US" smtClean="0"/>
-              <a:t>5/8/2023</a:t>
+              <a:t>5/9/2023</a:t>
             </a:fld>
             <a:endParaRPr lang="en-US"/>
           </a:p>
@@ -1811,7 +1817,7 @@
           <a:p>
             <a:fld id="{5D0E3E9C-DB1F-4A1E-AAB4-85CBF81E55B3}" type="datetimeFigureOut">
               <a:rPr lang="en-US" smtClean="0"/>
-              <a:t>5/8/2023</a:t>
+              <a:t>5/9/2023</a:t>
             </a:fld>
             <a:endParaRPr lang="en-US"/>
           </a:p>
@@ -1952,7 +1958,7 @@
           <a:p>
             <a:fld id="{5D0E3E9C-DB1F-4A1E-AAB4-85CBF81E55B3}" type="datetimeFigureOut">
               <a:rPr lang="en-US" smtClean="0"/>
-              <a:t>5/8/2023</a:t>
+              <a:t>5/9/2023</a:t>
             </a:fld>
             <a:endParaRPr lang="en-US"/>
           </a:p>
@@ -2065,7 +2071,7 @@
           <a:p>
             <a:fld id="{5D0E3E9C-DB1F-4A1E-AAB4-85CBF81E55B3}" type="datetimeFigureOut">
               <a:rPr lang="en-US" smtClean="0"/>
-              <a:t>5/8/2023</a:t>
+              <a:t>5/9/2023</a:t>
             </a:fld>
             <a:endParaRPr lang="en-US"/>
           </a:p>
@@ -2376,7 +2382,7 @@
           <a:p>
             <a:fld id="{5D0E3E9C-DB1F-4A1E-AAB4-85CBF81E55B3}" type="datetimeFigureOut">
               <a:rPr lang="en-US" smtClean="0"/>
-              <a:t>5/8/2023</a:t>
+              <a:t>5/9/2023</a:t>
             </a:fld>
             <a:endParaRPr lang="en-US"/>
           </a:p>
@@ -2664,7 +2670,7 @@
           <a:p>
             <a:fld id="{5D0E3E9C-DB1F-4A1E-AAB4-85CBF81E55B3}" type="datetimeFigureOut">
               <a:rPr lang="en-US" smtClean="0"/>
-              <a:t>5/8/2023</a:t>
+              <a:t>5/9/2023</a:t>
             </a:fld>
             <a:endParaRPr lang="en-US"/>
           </a:p>
@@ -2905,7 +2911,7 @@
           <a:p>
             <a:fld id="{5D0E3E9C-DB1F-4A1E-AAB4-85CBF81E55B3}" type="datetimeFigureOut">
               <a:rPr lang="en-US" smtClean="0"/>
-              <a:t>5/8/2023</a:t>
+              <a:t>5/9/2023</a:t>
             </a:fld>
             <a:endParaRPr lang="en-US"/>
           </a:p>
@@ -4012,6 +4018,885 @@
 </p:sld>
 </file>
 
+<file path=ppt/slides/slide3.xml><?xml version="1.0" encoding="utf-8"?>
+<p:sld xmlns:a="http://schemas.openxmlformats.org/drawingml/2006/main" xmlns:r="http://schemas.openxmlformats.org/officeDocument/2006/relationships" xmlns:p="http://schemas.openxmlformats.org/presentationml/2006/main">
+  <p:cSld>
+    <p:spTree>
+      <p:nvGrpSpPr>
+        <p:cNvPr id="1" name=""/>
+        <p:cNvGrpSpPr/>
+        <p:nvPr/>
+      </p:nvGrpSpPr>
+      <p:grpSpPr>
+        <a:xfrm>
+          <a:off x="0" y="0"/>
+          <a:ext cx="0" cy="0"/>
+          <a:chOff x="0" y="0"/>
+          <a:chExt cx="0" cy="0"/>
+        </a:xfrm>
+      </p:grpSpPr>
+      <p:sp>
+        <p:nvSpPr>
+          <p:cNvPr id="4" name="Flowchart: Predefined Process 3">
+            <a:extLst>
+              <a:ext uri="{FF2B5EF4-FFF2-40B4-BE49-F238E27FC236}">
+                <a16:creationId xmlns:a16="http://schemas.microsoft.com/office/drawing/2014/main" id="{24FBE044-6F40-E7D9-EAD3-BC74A9FE5432}"/>
+              </a:ext>
+            </a:extLst>
+          </p:cNvPr>
+          <p:cNvSpPr/>
+          <p:nvPr/>
+        </p:nvSpPr>
+        <p:spPr>
+          <a:xfrm>
+            <a:off x="1147156" y="2776451"/>
+            <a:ext cx="2133600" cy="1130531"/>
+          </a:xfrm>
+          <a:prstGeom prst="flowChartPredefinedProcess">
+            <a:avLst/>
+          </a:prstGeom>
+        </p:spPr>
+        <p:style>
+          <a:lnRef idx="2">
+            <a:schemeClr val="accent1">
+              <a:shade val="50000"/>
+            </a:schemeClr>
+          </a:lnRef>
+          <a:fillRef idx="1">
+            <a:schemeClr val="accent1"/>
+          </a:fillRef>
+          <a:effectRef idx="0">
+            <a:schemeClr val="accent1"/>
+          </a:effectRef>
+          <a:fontRef idx="minor">
+            <a:schemeClr val="lt1"/>
+          </a:fontRef>
+        </p:style>
+        <p:txBody>
+          <a:bodyPr rtlCol="0" anchor="ctr"/>
+          <a:lstStyle/>
+          <a:p>
+            <a:pPr algn="ctr"/>
+            <a:r>
+              <a:rPr lang="en-US" dirty="0"/>
+              <a:t>1</a:t>
+            </a:r>
+          </a:p>
+        </p:txBody>
+      </p:sp>
+      <p:sp>
+        <p:nvSpPr>
+          <p:cNvPr id="5" name="Flowchart: Predefined Process 4">
+            <a:extLst>
+              <a:ext uri="{FF2B5EF4-FFF2-40B4-BE49-F238E27FC236}">
+                <a16:creationId xmlns:a16="http://schemas.microsoft.com/office/drawing/2014/main" id="{0B6846B9-60A2-82DB-D22C-9EE423ACD195}"/>
+              </a:ext>
+            </a:extLst>
+          </p:cNvPr>
+          <p:cNvSpPr/>
+          <p:nvPr/>
+        </p:nvSpPr>
+        <p:spPr>
+          <a:xfrm>
+            <a:off x="7927571" y="3906982"/>
+            <a:ext cx="2133600" cy="1130531"/>
+          </a:xfrm>
+          <a:prstGeom prst="flowChartPredefinedProcess">
+            <a:avLst/>
+          </a:prstGeom>
+        </p:spPr>
+        <p:style>
+          <a:lnRef idx="2">
+            <a:schemeClr val="accent1">
+              <a:shade val="50000"/>
+            </a:schemeClr>
+          </a:lnRef>
+          <a:fillRef idx="1">
+            <a:schemeClr val="accent1"/>
+          </a:fillRef>
+          <a:effectRef idx="0">
+            <a:schemeClr val="accent1"/>
+          </a:effectRef>
+          <a:fontRef idx="minor">
+            <a:schemeClr val="lt1"/>
+          </a:fontRef>
+        </p:style>
+        <p:txBody>
+          <a:bodyPr rtlCol="0" anchor="ctr"/>
+          <a:lstStyle/>
+          <a:p>
+            <a:pPr algn="ctr"/>
+            <a:r>
+              <a:rPr lang="en-US" b="1" dirty="0"/>
+              <a:t>3</a:t>
+            </a:r>
+          </a:p>
+        </p:txBody>
+      </p:sp>
+      <p:sp>
+        <p:nvSpPr>
+          <p:cNvPr id="6" name="Flowchart: Predefined Process 5">
+            <a:extLst>
+              <a:ext uri="{FF2B5EF4-FFF2-40B4-BE49-F238E27FC236}">
+                <a16:creationId xmlns:a16="http://schemas.microsoft.com/office/drawing/2014/main" id="{9147FC95-F1C4-7777-C651-3BB043CDF064}"/>
+              </a:ext>
+            </a:extLst>
+          </p:cNvPr>
+          <p:cNvSpPr/>
+          <p:nvPr/>
+        </p:nvSpPr>
+        <p:spPr>
+          <a:xfrm>
+            <a:off x="2743200" y="631768"/>
+            <a:ext cx="2133600" cy="1130531"/>
+          </a:xfrm>
+          <a:prstGeom prst="flowChartPredefinedProcess">
+            <a:avLst/>
+          </a:prstGeom>
+        </p:spPr>
+        <p:style>
+          <a:lnRef idx="2">
+            <a:schemeClr val="accent1">
+              <a:shade val="50000"/>
+            </a:schemeClr>
+          </a:lnRef>
+          <a:fillRef idx="1">
+            <a:schemeClr val="accent1"/>
+          </a:fillRef>
+          <a:effectRef idx="0">
+            <a:schemeClr val="accent1"/>
+          </a:effectRef>
+          <a:fontRef idx="minor">
+            <a:schemeClr val="lt1"/>
+          </a:fontRef>
+        </p:style>
+        <p:txBody>
+          <a:bodyPr rtlCol="0" anchor="ctr"/>
+          <a:lstStyle/>
+          <a:p>
+            <a:pPr algn="ctr"/>
+            <a:r>
+              <a:rPr lang="en-US" dirty="0"/>
+              <a:t>4</a:t>
+            </a:r>
+          </a:p>
+        </p:txBody>
+      </p:sp>
+      <p:sp>
+        <p:nvSpPr>
+          <p:cNvPr id="7" name="Flowchart: Predefined Process 6">
+            <a:extLst>
+              <a:ext uri="{FF2B5EF4-FFF2-40B4-BE49-F238E27FC236}">
+                <a16:creationId xmlns:a16="http://schemas.microsoft.com/office/drawing/2014/main" id="{08EEF41D-3F3A-10FC-2B3C-6D3B125AF49D}"/>
+              </a:ext>
+            </a:extLst>
+          </p:cNvPr>
+          <p:cNvSpPr/>
+          <p:nvPr/>
+        </p:nvSpPr>
+        <p:spPr>
+          <a:xfrm>
+            <a:off x="4103715" y="5217621"/>
+            <a:ext cx="2133600" cy="1130531"/>
+          </a:xfrm>
+          <a:prstGeom prst="flowChartPredefinedProcess">
+            <a:avLst/>
+          </a:prstGeom>
+        </p:spPr>
+        <p:style>
+          <a:lnRef idx="2">
+            <a:schemeClr val="accent1">
+              <a:shade val="50000"/>
+            </a:schemeClr>
+          </a:lnRef>
+          <a:fillRef idx="1">
+            <a:schemeClr val="accent1"/>
+          </a:fillRef>
+          <a:effectRef idx="0">
+            <a:schemeClr val="accent1"/>
+          </a:effectRef>
+          <a:fontRef idx="minor">
+            <a:schemeClr val="lt1"/>
+          </a:fontRef>
+        </p:style>
+        <p:txBody>
+          <a:bodyPr rtlCol="0" anchor="ctr"/>
+          <a:lstStyle/>
+          <a:p>
+            <a:pPr algn="ctr"/>
+            <a:r>
+              <a:rPr lang="en-US" dirty="0"/>
+              <a:t>5</a:t>
+            </a:r>
+          </a:p>
+        </p:txBody>
+      </p:sp>
+      <p:sp>
+        <p:nvSpPr>
+          <p:cNvPr id="8" name="Flowchart: Predefined Process 7">
+            <a:extLst>
+              <a:ext uri="{FF2B5EF4-FFF2-40B4-BE49-F238E27FC236}">
+                <a16:creationId xmlns:a16="http://schemas.microsoft.com/office/drawing/2014/main" id="{6348AA02-6543-F3FB-D619-0BB18AF52A2D}"/>
+              </a:ext>
+            </a:extLst>
+          </p:cNvPr>
+          <p:cNvSpPr/>
+          <p:nvPr/>
+        </p:nvSpPr>
+        <p:spPr>
+          <a:xfrm>
+            <a:off x="7065817" y="825730"/>
+            <a:ext cx="2133600" cy="1130531"/>
+          </a:xfrm>
+          <a:prstGeom prst="flowChartPredefinedProcess">
+            <a:avLst/>
+          </a:prstGeom>
+        </p:spPr>
+        <p:style>
+          <a:lnRef idx="2">
+            <a:schemeClr val="accent1">
+              <a:shade val="50000"/>
+            </a:schemeClr>
+          </a:lnRef>
+          <a:fillRef idx="1">
+            <a:schemeClr val="accent1"/>
+          </a:fillRef>
+          <a:effectRef idx="0">
+            <a:schemeClr val="accent1"/>
+          </a:effectRef>
+          <a:fontRef idx="minor">
+            <a:schemeClr val="lt1"/>
+          </a:fontRef>
+        </p:style>
+        <p:txBody>
+          <a:bodyPr rtlCol="0" anchor="ctr"/>
+          <a:lstStyle/>
+          <a:p>
+            <a:pPr algn="ctr"/>
+            <a:r>
+              <a:rPr lang="en-US" dirty="0"/>
+              <a:t>2</a:t>
+            </a:r>
+          </a:p>
+        </p:txBody>
+      </p:sp>
+      <p:cxnSp>
+        <p:nvCxnSpPr>
+          <p:cNvPr id="11" name="Straight Arrow Connector 10">
+            <a:extLst>
+              <a:ext uri="{FF2B5EF4-FFF2-40B4-BE49-F238E27FC236}">
+                <a16:creationId xmlns:a16="http://schemas.microsoft.com/office/drawing/2014/main" id="{243019FC-1221-67B2-4383-02A19DAF6CF0}"/>
+              </a:ext>
+            </a:extLst>
+          </p:cNvPr>
+          <p:cNvCxnSpPr>
+            <a:cxnSpLocks/>
+            <a:stCxn id="8" idx="3"/>
+          </p:cNvCxnSpPr>
+          <p:nvPr/>
+        </p:nvCxnSpPr>
+        <p:spPr>
+          <a:xfrm flipH="1">
+            <a:off x="7218217" y="1390996"/>
+            <a:ext cx="1981200" cy="152400"/>
+          </a:xfrm>
+          <a:prstGeom prst="straightConnector1">
+            <a:avLst/>
+          </a:prstGeom>
+          <a:ln>
+            <a:tailEnd type="triangle"/>
+          </a:ln>
+        </p:spPr>
+        <p:style>
+          <a:lnRef idx="1">
+            <a:schemeClr val="accent1"/>
+          </a:lnRef>
+          <a:fillRef idx="0">
+            <a:schemeClr val="accent1"/>
+          </a:fillRef>
+          <a:effectRef idx="0">
+            <a:schemeClr val="accent1"/>
+          </a:effectRef>
+          <a:fontRef idx="minor">
+            <a:schemeClr val="tx1"/>
+          </a:fontRef>
+        </p:style>
+      </p:cxnSp>
+      <p:cxnSp>
+        <p:nvCxnSpPr>
+          <p:cNvPr id="14" name="Connector: Elbow 13">
+            <a:extLst>
+              <a:ext uri="{FF2B5EF4-FFF2-40B4-BE49-F238E27FC236}">
+                <a16:creationId xmlns:a16="http://schemas.microsoft.com/office/drawing/2014/main" id="{4AE7663A-D484-5F86-509E-174E4ED9FDE7}"/>
+              </a:ext>
+            </a:extLst>
+          </p:cNvPr>
+          <p:cNvCxnSpPr>
+            <a:stCxn id="4" idx="3"/>
+            <a:endCxn id="8" idx="1"/>
+          </p:cNvCxnSpPr>
+          <p:nvPr/>
+        </p:nvCxnSpPr>
+        <p:spPr>
+          <a:xfrm flipV="1">
+            <a:off x="3280756" y="1390996"/>
+            <a:ext cx="3785061" cy="1950721"/>
+          </a:xfrm>
+          <a:prstGeom prst="bentConnector3">
+            <a:avLst>
+              <a:gd name="adj1" fmla="val 66838"/>
+            </a:avLst>
+          </a:prstGeom>
+          <a:ln>
+            <a:tailEnd type="triangle"/>
+          </a:ln>
+        </p:spPr>
+        <p:style>
+          <a:lnRef idx="1">
+            <a:schemeClr val="accent2"/>
+          </a:lnRef>
+          <a:fillRef idx="0">
+            <a:schemeClr val="accent2"/>
+          </a:fillRef>
+          <a:effectRef idx="0">
+            <a:schemeClr val="accent2"/>
+          </a:effectRef>
+          <a:fontRef idx="minor">
+            <a:schemeClr val="tx1"/>
+          </a:fontRef>
+        </p:style>
+      </p:cxnSp>
+      <p:cxnSp>
+        <p:nvCxnSpPr>
+          <p:cNvPr id="16" name="Connector: Elbow 15">
+            <a:extLst>
+              <a:ext uri="{FF2B5EF4-FFF2-40B4-BE49-F238E27FC236}">
+                <a16:creationId xmlns:a16="http://schemas.microsoft.com/office/drawing/2014/main" id="{23D3C8C1-99E8-F763-945C-20BDA5E03A2A}"/>
+              </a:ext>
+            </a:extLst>
+          </p:cNvPr>
+          <p:cNvCxnSpPr>
+            <a:cxnSpLocks/>
+            <a:stCxn id="8" idx="3"/>
+            <a:endCxn id="5" idx="1"/>
+          </p:cNvCxnSpPr>
+          <p:nvPr/>
+        </p:nvCxnSpPr>
+        <p:spPr>
+          <a:xfrm flipH="1">
+            <a:off x="7927571" y="1390996"/>
+            <a:ext cx="1271846" cy="3081252"/>
+          </a:xfrm>
+          <a:prstGeom prst="bentConnector5">
+            <a:avLst>
+              <a:gd name="adj1" fmla="val -17974"/>
+              <a:gd name="adj2" fmla="val 50000"/>
+              <a:gd name="adj3" fmla="val 117974"/>
+            </a:avLst>
+          </a:prstGeom>
+          <a:ln>
+            <a:tailEnd type="triangle"/>
+          </a:ln>
+        </p:spPr>
+        <p:style>
+          <a:lnRef idx="1">
+            <a:schemeClr val="accent2"/>
+          </a:lnRef>
+          <a:fillRef idx="0">
+            <a:schemeClr val="accent2"/>
+          </a:fillRef>
+          <a:effectRef idx="0">
+            <a:schemeClr val="accent2"/>
+          </a:effectRef>
+          <a:fontRef idx="minor">
+            <a:schemeClr val="tx1"/>
+          </a:fontRef>
+        </p:style>
+      </p:cxnSp>
+      <p:cxnSp>
+        <p:nvCxnSpPr>
+          <p:cNvPr id="19" name="Connector: Elbow 18">
+            <a:extLst>
+              <a:ext uri="{FF2B5EF4-FFF2-40B4-BE49-F238E27FC236}">
+                <a16:creationId xmlns:a16="http://schemas.microsoft.com/office/drawing/2014/main" id="{41313A77-A8AE-A41A-D07A-E31627B5FBD2}"/>
+              </a:ext>
+            </a:extLst>
+          </p:cNvPr>
+          <p:cNvCxnSpPr>
+            <a:cxnSpLocks/>
+            <a:stCxn id="5" idx="3"/>
+            <a:endCxn id="6" idx="1"/>
+          </p:cNvCxnSpPr>
+          <p:nvPr/>
+        </p:nvCxnSpPr>
+        <p:spPr>
+          <a:xfrm flipH="1" flipV="1">
+            <a:off x="2743200" y="1197034"/>
+            <a:ext cx="7317971" cy="3275214"/>
+          </a:xfrm>
+          <a:prstGeom prst="bentConnector5">
+            <a:avLst>
+              <a:gd name="adj1" fmla="val -3124"/>
+              <a:gd name="adj2" fmla="val 63029"/>
+              <a:gd name="adj3" fmla="val 103124"/>
+            </a:avLst>
+          </a:prstGeom>
+          <a:ln>
+            <a:tailEnd type="triangle"/>
+          </a:ln>
+        </p:spPr>
+        <p:style>
+          <a:lnRef idx="1">
+            <a:schemeClr val="accent2"/>
+          </a:lnRef>
+          <a:fillRef idx="0">
+            <a:schemeClr val="accent2"/>
+          </a:fillRef>
+          <a:effectRef idx="0">
+            <a:schemeClr val="accent2"/>
+          </a:effectRef>
+          <a:fontRef idx="minor">
+            <a:schemeClr val="tx1"/>
+          </a:fontRef>
+        </p:style>
+      </p:cxnSp>
+      <p:cxnSp>
+        <p:nvCxnSpPr>
+          <p:cNvPr id="25" name="Connector: Elbow 24">
+            <a:extLst>
+              <a:ext uri="{FF2B5EF4-FFF2-40B4-BE49-F238E27FC236}">
+                <a16:creationId xmlns:a16="http://schemas.microsoft.com/office/drawing/2014/main" id="{92F914C9-C832-578E-9B84-6AA3AF8C25AF}"/>
+              </a:ext>
+            </a:extLst>
+          </p:cNvPr>
+          <p:cNvCxnSpPr>
+            <a:cxnSpLocks/>
+            <a:stCxn id="6" idx="3"/>
+            <a:endCxn id="7" idx="1"/>
+          </p:cNvCxnSpPr>
+          <p:nvPr/>
+        </p:nvCxnSpPr>
+        <p:spPr>
+          <a:xfrm flipH="1">
+            <a:off x="4103715" y="1197034"/>
+            <a:ext cx="773085" cy="4585853"/>
+          </a:xfrm>
+          <a:prstGeom prst="bentConnector5">
+            <a:avLst>
+              <a:gd name="adj1" fmla="val -29570"/>
+              <a:gd name="adj2" fmla="val 67281"/>
+              <a:gd name="adj3" fmla="val 129570"/>
+            </a:avLst>
+          </a:prstGeom>
+          <a:ln>
+            <a:tailEnd type="triangle"/>
+          </a:ln>
+        </p:spPr>
+        <p:style>
+          <a:lnRef idx="1">
+            <a:schemeClr val="accent2"/>
+          </a:lnRef>
+          <a:fillRef idx="0">
+            <a:schemeClr val="accent2"/>
+          </a:fillRef>
+          <a:effectRef idx="0">
+            <a:schemeClr val="accent2"/>
+          </a:effectRef>
+          <a:fontRef idx="minor">
+            <a:schemeClr val="tx1"/>
+          </a:fontRef>
+        </p:style>
+      </p:cxnSp>
+      <p:cxnSp>
+        <p:nvCxnSpPr>
+          <p:cNvPr id="29" name="Connector: Elbow 28">
+            <a:extLst>
+              <a:ext uri="{FF2B5EF4-FFF2-40B4-BE49-F238E27FC236}">
+                <a16:creationId xmlns:a16="http://schemas.microsoft.com/office/drawing/2014/main" id="{F35DE030-6074-1043-F1DB-AA0101BBABEE}"/>
+              </a:ext>
+            </a:extLst>
+          </p:cNvPr>
+          <p:cNvCxnSpPr>
+            <a:cxnSpLocks/>
+            <a:stCxn id="7" idx="3"/>
+            <a:endCxn id="32" idx="1"/>
+          </p:cNvCxnSpPr>
+          <p:nvPr/>
+        </p:nvCxnSpPr>
+        <p:spPr>
+          <a:xfrm>
+            <a:off x="6237315" y="5782887"/>
+            <a:ext cx="1487980" cy="298274"/>
+          </a:xfrm>
+          <a:prstGeom prst="bentConnector3">
+            <a:avLst>
+              <a:gd name="adj1" fmla="val 50000"/>
+            </a:avLst>
+          </a:prstGeom>
+          <a:ln>
+            <a:tailEnd type="triangle"/>
+          </a:ln>
+        </p:spPr>
+        <p:style>
+          <a:lnRef idx="1">
+            <a:schemeClr val="accent2"/>
+          </a:lnRef>
+          <a:fillRef idx="0">
+            <a:schemeClr val="accent2"/>
+          </a:fillRef>
+          <a:effectRef idx="0">
+            <a:schemeClr val="accent2"/>
+          </a:effectRef>
+          <a:fontRef idx="minor">
+            <a:schemeClr val="tx1"/>
+          </a:fontRef>
+        </p:style>
+      </p:cxnSp>
+      <p:sp>
+        <p:nvSpPr>
+          <p:cNvPr id="32" name="TextBox 31">
+            <a:extLst>
+              <a:ext uri="{FF2B5EF4-FFF2-40B4-BE49-F238E27FC236}">
+                <a16:creationId xmlns:a16="http://schemas.microsoft.com/office/drawing/2014/main" id="{E72EA69B-4761-D452-2F68-10D14CEBFF60}"/>
+              </a:ext>
+            </a:extLst>
+          </p:cNvPr>
+          <p:cNvSpPr txBox="1"/>
+          <p:nvPr/>
+        </p:nvSpPr>
+        <p:spPr>
+          <a:xfrm>
+            <a:off x="7725295" y="5896495"/>
+            <a:ext cx="814647" cy="369332"/>
+          </a:xfrm>
+          <a:prstGeom prst="rect">
+            <a:avLst/>
+          </a:prstGeom>
+          <a:noFill/>
+        </p:spPr>
+        <p:txBody>
+          <a:bodyPr wrap="square" rtlCol="0">
+            <a:spAutoFit/>
+          </a:bodyPr>
+          <a:lstStyle/>
+          <a:p>
+            <a:r>
+              <a:rPr lang="en-US" dirty="0"/>
+              <a:t>Null</a:t>
+            </a:r>
+          </a:p>
+        </p:txBody>
+      </p:sp>
+      <p:sp>
+        <p:nvSpPr>
+          <p:cNvPr id="37" name="TextBox 36">
+            <a:extLst>
+              <a:ext uri="{FF2B5EF4-FFF2-40B4-BE49-F238E27FC236}">
+                <a16:creationId xmlns:a16="http://schemas.microsoft.com/office/drawing/2014/main" id="{1E9EAD45-7AEF-91C1-455A-51FA4F733793}"/>
+              </a:ext>
+            </a:extLst>
+          </p:cNvPr>
+          <p:cNvSpPr txBox="1"/>
+          <p:nvPr/>
+        </p:nvSpPr>
+        <p:spPr>
+          <a:xfrm>
+            <a:off x="2982884" y="3120628"/>
+            <a:ext cx="814647" cy="369332"/>
+          </a:xfrm>
+          <a:prstGeom prst="rect">
+            <a:avLst/>
+          </a:prstGeom>
+          <a:noFill/>
+        </p:spPr>
+        <p:txBody>
+          <a:bodyPr wrap="square" rtlCol="0">
+            <a:spAutoFit/>
+          </a:bodyPr>
+          <a:lstStyle/>
+          <a:p>
+            <a:r>
+              <a:rPr lang="en-US" dirty="0"/>
+              <a:t>Next</a:t>
+            </a:r>
+          </a:p>
+        </p:txBody>
+      </p:sp>
+      <p:sp>
+        <p:nvSpPr>
+          <p:cNvPr id="38" name="TextBox 37">
+            <a:extLst>
+              <a:ext uri="{FF2B5EF4-FFF2-40B4-BE49-F238E27FC236}">
+                <a16:creationId xmlns:a16="http://schemas.microsoft.com/office/drawing/2014/main" id="{588C2B52-C926-7478-FE72-445BD7184E1B}"/>
+              </a:ext>
+            </a:extLst>
+          </p:cNvPr>
+          <p:cNvSpPr txBox="1"/>
+          <p:nvPr/>
+        </p:nvSpPr>
+        <p:spPr>
+          <a:xfrm>
+            <a:off x="9653847" y="4287581"/>
+            <a:ext cx="814647" cy="369332"/>
+          </a:xfrm>
+          <a:prstGeom prst="rect">
+            <a:avLst/>
+          </a:prstGeom>
+          <a:noFill/>
+        </p:spPr>
+        <p:txBody>
+          <a:bodyPr wrap="square" rtlCol="0">
+            <a:spAutoFit/>
+          </a:bodyPr>
+          <a:lstStyle/>
+          <a:p>
+            <a:r>
+              <a:rPr lang="en-US" dirty="0"/>
+              <a:t>Next</a:t>
+            </a:r>
+          </a:p>
+        </p:txBody>
+      </p:sp>
+      <p:sp>
+        <p:nvSpPr>
+          <p:cNvPr id="39" name="TextBox 38">
+            <a:extLst>
+              <a:ext uri="{FF2B5EF4-FFF2-40B4-BE49-F238E27FC236}">
+                <a16:creationId xmlns:a16="http://schemas.microsoft.com/office/drawing/2014/main" id="{26CF8047-5175-A234-BE03-4AE7BEDC80D6}"/>
+              </a:ext>
+            </a:extLst>
+          </p:cNvPr>
+          <p:cNvSpPr txBox="1"/>
+          <p:nvPr/>
+        </p:nvSpPr>
+        <p:spPr>
+          <a:xfrm>
+            <a:off x="5911734" y="5752407"/>
+            <a:ext cx="814647" cy="369332"/>
+          </a:xfrm>
+          <a:prstGeom prst="rect">
+            <a:avLst/>
+          </a:prstGeom>
+          <a:noFill/>
+        </p:spPr>
+        <p:txBody>
+          <a:bodyPr wrap="square" rtlCol="0">
+            <a:spAutoFit/>
+          </a:bodyPr>
+          <a:lstStyle/>
+          <a:p>
+            <a:r>
+              <a:rPr lang="en-US" dirty="0"/>
+              <a:t>Next</a:t>
+            </a:r>
+          </a:p>
+        </p:txBody>
+      </p:sp>
+      <p:sp>
+        <p:nvSpPr>
+          <p:cNvPr id="40" name="TextBox 39">
+            <a:extLst>
+              <a:ext uri="{FF2B5EF4-FFF2-40B4-BE49-F238E27FC236}">
+                <a16:creationId xmlns:a16="http://schemas.microsoft.com/office/drawing/2014/main" id="{68392306-F35F-120B-3991-12A8CBA7CBB3}"/>
+              </a:ext>
+            </a:extLst>
+          </p:cNvPr>
+          <p:cNvSpPr txBox="1"/>
+          <p:nvPr/>
+        </p:nvSpPr>
+        <p:spPr>
+          <a:xfrm>
+            <a:off x="8792093" y="1197033"/>
+            <a:ext cx="814647" cy="369332"/>
+          </a:xfrm>
+          <a:prstGeom prst="rect">
+            <a:avLst/>
+          </a:prstGeom>
+          <a:noFill/>
+        </p:spPr>
+        <p:txBody>
+          <a:bodyPr wrap="square" rtlCol="0">
+            <a:spAutoFit/>
+          </a:bodyPr>
+          <a:lstStyle/>
+          <a:p>
+            <a:r>
+              <a:rPr lang="en-US" dirty="0"/>
+              <a:t>Next</a:t>
+            </a:r>
+          </a:p>
+        </p:txBody>
+      </p:sp>
+      <p:sp>
+        <p:nvSpPr>
+          <p:cNvPr id="41" name="TextBox 40">
+            <a:extLst>
+              <a:ext uri="{FF2B5EF4-FFF2-40B4-BE49-F238E27FC236}">
+                <a16:creationId xmlns:a16="http://schemas.microsoft.com/office/drawing/2014/main" id="{F9747AEC-593F-93EB-F5A6-7118BB7A2C71}"/>
+              </a:ext>
+            </a:extLst>
+          </p:cNvPr>
+          <p:cNvSpPr txBox="1"/>
+          <p:nvPr/>
+        </p:nvSpPr>
+        <p:spPr>
+          <a:xfrm>
+            <a:off x="5911734" y="5752407"/>
+            <a:ext cx="814647" cy="369332"/>
+          </a:xfrm>
+          <a:prstGeom prst="rect">
+            <a:avLst/>
+          </a:prstGeom>
+          <a:noFill/>
+        </p:spPr>
+        <p:txBody>
+          <a:bodyPr wrap="square" rtlCol="0">
+            <a:spAutoFit/>
+          </a:bodyPr>
+          <a:lstStyle/>
+          <a:p>
+            <a:r>
+              <a:rPr lang="en-US" dirty="0"/>
+              <a:t>Next</a:t>
+            </a:r>
+          </a:p>
+        </p:txBody>
+      </p:sp>
+      <p:sp>
+        <p:nvSpPr>
+          <p:cNvPr id="42" name="TextBox 41">
+            <a:extLst>
+              <a:ext uri="{FF2B5EF4-FFF2-40B4-BE49-F238E27FC236}">
+                <a16:creationId xmlns:a16="http://schemas.microsoft.com/office/drawing/2014/main" id="{DFB91A75-0ED1-D908-7BA1-EF7EEE84DFFA}"/>
+              </a:ext>
+            </a:extLst>
+          </p:cNvPr>
+          <p:cNvSpPr txBox="1"/>
+          <p:nvPr/>
+        </p:nvSpPr>
+        <p:spPr>
+          <a:xfrm>
+            <a:off x="4493029" y="1012367"/>
+            <a:ext cx="814647" cy="369332"/>
+          </a:xfrm>
+          <a:prstGeom prst="rect">
+            <a:avLst/>
+          </a:prstGeom>
+          <a:noFill/>
+        </p:spPr>
+        <p:txBody>
+          <a:bodyPr wrap="square" rtlCol="0">
+            <a:spAutoFit/>
+          </a:bodyPr>
+          <a:lstStyle/>
+          <a:p>
+            <a:r>
+              <a:rPr lang="en-US" dirty="0"/>
+              <a:t>Next</a:t>
+            </a:r>
+          </a:p>
+        </p:txBody>
+      </p:sp>
+      <p:sp>
+        <p:nvSpPr>
+          <p:cNvPr id="43" name="TextBox 42">
+            <a:extLst>
+              <a:ext uri="{FF2B5EF4-FFF2-40B4-BE49-F238E27FC236}">
+                <a16:creationId xmlns:a16="http://schemas.microsoft.com/office/drawing/2014/main" id="{A31DEC26-B9D1-E075-21D6-08C6CCBCD21E}"/>
+              </a:ext>
+            </a:extLst>
+          </p:cNvPr>
+          <p:cNvSpPr txBox="1"/>
+          <p:nvPr/>
+        </p:nvSpPr>
+        <p:spPr>
+          <a:xfrm>
+            <a:off x="40177" y="456398"/>
+            <a:ext cx="1888375" cy="923330"/>
+          </a:xfrm>
+          <a:prstGeom prst="rect">
+            <a:avLst/>
+          </a:prstGeom>
+          <a:noFill/>
+        </p:spPr>
+        <p:txBody>
+          <a:bodyPr wrap="square" rtlCol="0">
+            <a:spAutoFit/>
+          </a:bodyPr>
+          <a:lstStyle/>
+          <a:p>
+            <a:r>
+              <a:rPr lang="en-US" dirty="0" err="1"/>
+              <a:t>SingleyLinkedList</a:t>
+            </a:r>
+            <a:r>
+              <a:rPr lang="en-US" dirty="0"/>
+              <a:t> SLL</a:t>
+            </a:r>
+          </a:p>
+          <a:p>
+            <a:r>
+              <a:rPr lang="en-US" dirty="0"/>
+              <a:t>Node First</a:t>
+            </a:r>
+          </a:p>
+        </p:txBody>
+      </p:sp>
+      <p:cxnSp>
+        <p:nvCxnSpPr>
+          <p:cNvPr id="45" name="Connector: Elbow 44">
+            <a:extLst>
+              <a:ext uri="{FF2B5EF4-FFF2-40B4-BE49-F238E27FC236}">
+                <a16:creationId xmlns:a16="http://schemas.microsoft.com/office/drawing/2014/main" id="{8CEA54C7-3860-7B71-9515-78F09AEA01B7}"/>
+              </a:ext>
+            </a:extLst>
+          </p:cNvPr>
+          <p:cNvCxnSpPr>
+            <a:stCxn id="43" idx="2"/>
+            <a:endCxn id="4" idx="1"/>
+          </p:cNvCxnSpPr>
+          <p:nvPr/>
+        </p:nvCxnSpPr>
+        <p:spPr>
+          <a:xfrm rot="16200000" flipH="1">
+            <a:off x="84766" y="2279326"/>
+            <a:ext cx="1961989" cy="162791"/>
+          </a:xfrm>
+          <a:prstGeom prst="bentConnector2">
+            <a:avLst/>
+          </a:prstGeom>
+          <a:ln>
+            <a:tailEnd type="triangle"/>
+          </a:ln>
+        </p:spPr>
+        <p:style>
+          <a:lnRef idx="1">
+            <a:schemeClr val="accent1"/>
+          </a:lnRef>
+          <a:fillRef idx="0">
+            <a:schemeClr val="accent1"/>
+          </a:fillRef>
+          <a:effectRef idx="0">
+            <a:schemeClr val="accent1"/>
+          </a:effectRef>
+          <a:fontRef idx="minor">
+            <a:schemeClr val="tx1"/>
+          </a:fontRef>
+        </p:style>
+      </p:cxnSp>
+    </p:spTree>
+    <p:extLst>
+      <p:ext uri="{BB962C8B-B14F-4D97-AF65-F5344CB8AC3E}">
+        <p14:creationId xmlns:p14="http://schemas.microsoft.com/office/powerpoint/2010/main" val="1581081824"/>
+      </p:ext>
+    </p:extLst>
+  </p:cSld>
+  <p:clrMapOvr>
+    <a:masterClrMapping/>
+  </p:clrMapOvr>
+</p:sld>
+</file>
+
 <file path=ppt/theme/theme1.xml><?xml version="1.0" encoding="utf-8"?>
 <a:theme xmlns:a="http://schemas.openxmlformats.org/drawingml/2006/main" name="Office Theme">
   <a:themeElements>

</xml_diff>

<commit_message>
adds refactored rps with file I/O persistence
</commit_message>
<xml_diff>
--- a/Marks Drawrings.pptx
+++ b/Marks Drawrings.pptx
@@ -8,6 +8,7 @@
     <p:sldId id="256" r:id="rId2"/>
     <p:sldId id="257" r:id="rId3"/>
     <p:sldId id="258" r:id="rId4"/>
+    <p:sldId id="259" r:id="rId5"/>
   </p:sldIdLst>
   <p:sldSz cx="12192000" cy="6858000"/>
   <p:notesSz cx="6858000" cy="9144000"/>
@@ -261,7 +262,7 @@
           <a:p>
             <a:fld id="{5D0E3E9C-DB1F-4A1E-AAB4-85CBF81E55B3}" type="datetimeFigureOut">
               <a:rPr lang="en-US" smtClean="0"/>
-              <a:t>5/9/2023</a:t>
+              <a:t>5/10/2023</a:t>
             </a:fld>
             <a:endParaRPr lang="en-US"/>
           </a:p>
@@ -459,7 +460,7 @@
           <a:p>
             <a:fld id="{5D0E3E9C-DB1F-4A1E-AAB4-85CBF81E55B3}" type="datetimeFigureOut">
               <a:rPr lang="en-US" smtClean="0"/>
-              <a:t>5/9/2023</a:t>
+              <a:t>5/10/2023</a:t>
             </a:fld>
             <a:endParaRPr lang="en-US"/>
           </a:p>
@@ -667,7 +668,7 @@
           <a:p>
             <a:fld id="{5D0E3E9C-DB1F-4A1E-AAB4-85CBF81E55B3}" type="datetimeFigureOut">
               <a:rPr lang="en-US" smtClean="0"/>
-              <a:t>5/9/2023</a:t>
+              <a:t>5/10/2023</a:t>
             </a:fld>
             <a:endParaRPr lang="en-US"/>
           </a:p>
@@ -865,7 +866,7 @@
           <a:p>
             <a:fld id="{5D0E3E9C-DB1F-4A1E-AAB4-85CBF81E55B3}" type="datetimeFigureOut">
               <a:rPr lang="en-US" smtClean="0"/>
-              <a:t>5/9/2023</a:t>
+              <a:t>5/10/2023</a:t>
             </a:fld>
             <a:endParaRPr lang="en-US"/>
           </a:p>
@@ -1140,7 +1141,7 @@
           <a:p>
             <a:fld id="{5D0E3E9C-DB1F-4A1E-AAB4-85CBF81E55B3}" type="datetimeFigureOut">
               <a:rPr lang="en-US" smtClean="0"/>
-              <a:t>5/9/2023</a:t>
+              <a:t>5/10/2023</a:t>
             </a:fld>
             <a:endParaRPr lang="en-US"/>
           </a:p>
@@ -1405,7 +1406,7 @@
           <a:p>
             <a:fld id="{5D0E3E9C-DB1F-4A1E-AAB4-85CBF81E55B3}" type="datetimeFigureOut">
               <a:rPr lang="en-US" smtClean="0"/>
-              <a:t>5/9/2023</a:t>
+              <a:t>5/10/2023</a:t>
             </a:fld>
             <a:endParaRPr lang="en-US"/>
           </a:p>
@@ -1817,7 +1818,7 @@
           <a:p>
             <a:fld id="{5D0E3E9C-DB1F-4A1E-AAB4-85CBF81E55B3}" type="datetimeFigureOut">
               <a:rPr lang="en-US" smtClean="0"/>
-              <a:t>5/9/2023</a:t>
+              <a:t>5/10/2023</a:t>
             </a:fld>
             <a:endParaRPr lang="en-US"/>
           </a:p>
@@ -1958,7 +1959,7 @@
           <a:p>
             <a:fld id="{5D0E3E9C-DB1F-4A1E-AAB4-85CBF81E55B3}" type="datetimeFigureOut">
               <a:rPr lang="en-US" smtClean="0"/>
-              <a:t>5/9/2023</a:t>
+              <a:t>5/10/2023</a:t>
             </a:fld>
             <a:endParaRPr lang="en-US"/>
           </a:p>
@@ -2071,7 +2072,7 @@
           <a:p>
             <a:fld id="{5D0E3E9C-DB1F-4A1E-AAB4-85CBF81E55B3}" type="datetimeFigureOut">
               <a:rPr lang="en-US" smtClean="0"/>
-              <a:t>5/9/2023</a:t>
+              <a:t>5/10/2023</a:t>
             </a:fld>
             <a:endParaRPr lang="en-US"/>
           </a:p>
@@ -2382,7 +2383,7 @@
           <a:p>
             <a:fld id="{5D0E3E9C-DB1F-4A1E-AAB4-85CBF81E55B3}" type="datetimeFigureOut">
               <a:rPr lang="en-US" smtClean="0"/>
-              <a:t>5/9/2023</a:t>
+              <a:t>5/10/2023</a:t>
             </a:fld>
             <a:endParaRPr lang="en-US"/>
           </a:p>
@@ -2670,7 +2671,7 @@
           <a:p>
             <a:fld id="{5D0E3E9C-DB1F-4A1E-AAB4-85CBF81E55B3}" type="datetimeFigureOut">
               <a:rPr lang="en-US" smtClean="0"/>
-              <a:t>5/9/2023</a:t>
+              <a:t>5/10/2023</a:t>
             </a:fld>
             <a:endParaRPr lang="en-US"/>
           </a:p>
@@ -2911,7 +2912,7 @@
           <a:p>
             <a:fld id="{5D0E3E9C-DB1F-4A1E-AAB4-85CBF81E55B3}" type="datetimeFigureOut">
               <a:rPr lang="en-US" smtClean="0"/>
-              <a:t>5/9/2023</a:t>
+              <a:t>5/10/2023</a:t>
             </a:fld>
             <a:endParaRPr lang="en-US"/>
           </a:p>
@@ -4897,6 +4898,635 @@
 </p:sld>
 </file>
 
+<file path=ppt/slides/slide4.xml><?xml version="1.0" encoding="utf-8"?>
+<p:sld xmlns:a="http://schemas.openxmlformats.org/drawingml/2006/main" xmlns:r="http://schemas.openxmlformats.org/officeDocument/2006/relationships" xmlns:p="http://schemas.openxmlformats.org/presentationml/2006/main">
+  <p:cSld>
+    <p:spTree>
+      <p:nvGrpSpPr>
+        <p:cNvPr id="1" name=""/>
+        <p:cNvGrpSpPr/>
+        <p:nvPr/>
+      </p:nvGrpSpPr>
+      <p:grpSpPr>
+        <a:xfrm>
+          <a:off x="0" y="0"/>
+          <a:ext cx="0" cy="0"/>
+          <a:chOff x="0" y="0"/>
+          <a:chExt cx="0" cy="0"/>
+        </a:xfrm>
+      </p:grpSpPr>
+      <p:sp>
+        <p:nvSpPr>
+          <p:cNvPr id="2" name="Title 1">
+            <a:extLst>
+              <a:ext uri="{FF2B5EF4-FFF2-40B4-BE49-F238E27FC236}">
+                <a16:creationId xmlns:a16="http://schemas.microsoft.com/office/drawing/2014/main" id="{623B6EEB-4A73-0C51-22A4-75538E885CA0}"/>
+              </a:ext>
+            </a:extLst>
+          </p:cNvPr>
+          <p:cNvSpPr>
+            <a:spLocks noGrp="1"/>
+          </p:cNvSpPr>
+          <p:nvPr>
+            <p:ph type="title"/>
+          </p:nvPr>
+        </p:nvSpPr>
+        <p:spPr/>
+        <p:txBody>
+          <a:bodyPr>
+            <a:normAutofit fontScale="90000"/>
+          </a:bodyPr>
+          <a:lstStyle/>
+          <a:p>
+            <a:r>
+              <a:rPr lang="en-US" dirty="0"/>
+              <a:t>Why I can declare a round inside the if-statement and it doesn’t get garbage collected.</a:t>
+            </a:r>
+          </a:p>
+        </p:txBody>
+      </p:sp>
+      <p:sp>
+        <p:nvSpPr>
+          <p:cNvPr id="4" name="Rectangle 3">
+            <a:extLst>
+              <a:ext uri="{FF2B5EF4-FFF2-40B4-BE49-F238E27FC236}">
+                <a16:creationId xmlns:a16="http://schemas.microsoft.com/office/drawing/2014/main" id="{23E4214B-4094-EFFE-07C1-A7F195F2602B}"/>
+              </a:ext>
+            </a:extLst>
+          </p:cNvPr>
+          <p:cNvSpPr/>
+          <p:nvPr/>
+        </p:nvSpPr>
+        <p:spPr>
+          <a:xfrm>
+            <a:off x="7270865" y="2432858"/>
+            <a:ext cx="2604655" cy="4060017"/>
+          </a:xfrm>
+          <a:prstGeom prst="rect">
+            <a:avLst/>
+          </a:prstGeom>
+          <a:noFill/>
+        </p:spPr>
+        <p:style>
+          <a:lnRef idx="2">
+            <a:schemeClr val="accent1">
+              <a:shade val="50000"/>
+            </a:schemeClr>
+          </a:lnRef>
+          <a:fillRef idx="1">
+            <a:schemeClr val="accent1"/>
+          </a:fillRef>
+          <a:effectRef idx="0">
+            <a:schemeClr val="accent1"/>
+          </a:effectRef>
+          <a:fontRef idx="minor">
+            <a:schemeClr val="lt1"/>
+          </a:fontRef>
+        </p:style>
+        <p:txBody>
+          <a:bodyPr rtlCol="0" anchor="ctr"/>
+          <a:lstStyle/>
+          <a:p>
+            <a:pPr algn="ctr"/>
+            <a:endParaRPr lang="en-US"/>
+          </a:p>
+        </p:txBody>
+      </p:sp>
+      <p:cxnSp>
+        <p:nvCxnSpPr>
+          <p:cNvPr id="6" name="Straight Connector 5">
+            <a:extLst>
+              <a:ext uri="{FF2B5EF4-FFF2-40B4-BE49-F238E27FC236}">
+                <a16:creationId xmlns:a16="http://schemas.microsoft.com/office/drawing/2014/main" id="{D49B2820-54C5-5858-9AB5-2AD99D53D04C}"/>
+              </a:ext>
+            </a:extLst>
+          </p:cNvPr>
+          <p:cNvCxnSpPr/>
+          <p:nvPr/>
+        </p:nvCxnSpPr>
+        <p:spPr>
+          <a:xfrm>
+            <a:off x="7270865" y="2824316"/>
+            <a:ext cx="2604655" cy="0"/>
+          </a:xfrm>
+          <a:prstGeom prst="line">
+            <a:avLst/>
+          </a:prstGeom>
+        </p:spPr>
+        <p:style>
+          <a:lnRef idx="1">
+            <a:schemeClr val="accent1"/>
+          </a:lnRef>
+          <a:fillRef idx="0">
+            <a:schemeClr val="accent1"/>
+          </a:fillRef>
+          <a:effectRef idx="0">
+            <a:schemeClr val="accent1"/>
+          </a:effectRef>
+          <a:fontRef idx="minor">
+            <a:schemeClr val="tx1"/>
+          </a:fontRef>
+        </p:style>
+      </p:cxnSp>
+      <p:cxnSp>
+        <p:nvCxnSpPr>
+          <p:cNvPr id="7" name="Straight Connector 6">
+            <a:extLst>
+              <a:ext uri="{FF2B5EF4-FFF2-40B4-BE49-F238E27FC236}">
+                <a16:creationId xmlns:a16="http://schemas.microsoft.com/office/drawing/2014/main" id="{EE5DB15E-8E46-8A2C-776A-86218F4E4291}"/>
+              </a:ext>
+            </a:extLst>
+          </p:cNvPr>
+          <p:cNvCxnSpPr/>
+          <p:nvPr/>
+        </p:nvCxnSpPr>
+        <p:spPr>
+          <a:xfrm>
+            <a:off x="7261036" y="3249560"/>
+            <a:ext cx="2604655" cy="0"/>
+          </a:xfrm>
+          <a:prstGeom prst="line">
+            <a:avLst/>
+          </a:prstGeom>
+        </p:spPr>
+        <p:style>
+          <a:lnRef idx="1">
+            <a:schemeClr val="accent1"/>
+          </a:lnRef>
+          <a:fillRef idx="0">
+            <a:schemeClr val="accent1"/>
+          </a:fillRef>
+          <a:effectRef idx="0">
+            <a:schemeClr val="accent1"/>
+          </a:effectRef>
+          <a:fontRef idx="minor">
+            <a:schemeClr val="tx1"/>
+          </a:fontRef>
+        </p:style>
+      </p:cxnSp>
+      <p:cxnSp>
+        <p:nvCxnSpPr>
+          <p:cNvPr id="8" name="Straight Connector 7">
+            <a:extLst>
+              <a:ext uri="{FF2B5EF4-FFF2-40B4-BE49-F238E27FC236}">
+                <a16:creationId xmlns:a16="http://schemas.microsoft.com/office/drawing/2014/main" id="{93FA931F-42D0-378B-1209-4FE342C76AA3}"/>
+              </a:ext>
+            </a:extLst>
+          </p:cNvPr>
+          <p:cNvCxnSpPr/>
+          <p:nvPr/>
+        </p:nvCxnSpPr>
+        <p:spPr>
+          <a:xfrm>
+            <a:off x="7270865" y="3625645"/>
+            <a:ext cx="2604655" cy="0"/>
+          </a:xfrm>
+          <a:prstGeom prst="line">
+            <a:avLst/>
+          </a:prstGeom>
+        </p:spPr>
+        <p:style>
+          <a:lnRef idx="1">
+            <a:schemeClr val="accent1"/>
+          </a:lnRef>
+          <a:fillRef idx="0">
+            <a:schemeClr val="accent1"/>
+          </a:fillRef>
+          <a:effectRef idx="0">
+            <a:schemeClr val="accent1"/>
+          </a:effectRef>
+          <a:fontRef idx="minor">
+            <a:schemeClr val="tx1"/>
+          </a:fontRef>
+        </p:style>
+      </p:cxnSp>
+      <p:cxnSp>
+        <p:nvCxnSpPr>
+          <p:cNvPr id="9" name="Straight Connector 8">
+            <a:extLst>
+              <a:ext uri="{FF2B5EF4-FFF2-40B4-BE49-F238E27FC236}">
+                <a16:creationId xmlns:a16="http://schemas.microsoft.com/office/drawing/2014/main" id="{D104FA0D-BB6C-DE20-DEA3-E29B90674E94}"/>
+              </a:ext>
+            </a:extLst>
+          </p:cNvPr>
+          <p:cNvCxnSpPr/>
+          <p:nvPr/>
+        </p:nvCxnSpPr>
+        <p:spPr>
+          <a:xfrm>
+            <a:off x="7261036" y="4050889"/>
+            <a:ext cx="2604655" cy="0"/>
+          </a:xfrm>
+          <a:prstGeom prst="line">
+            <a:avLst/>
+          </a:prstGeom>
+        </p:spPr>
+        <p:style>
+          <a:lnRef idx="1">
+            <a:schemeClr val="accent1"/>
+          </a:lnRef>
+          <a:fillRef idx="0">
+            <a:schemeClr val="accent1"/>
+          </a:fillRef>
+          <a:effectRef idx="0">
+            <a:schemeClr val="accent1"/>
+          </a:effectRef>
+          <a:fontRef idx="minor">
+            <a:schemeClr val="tx1"/>
+          </a:fontRef>
+        </p:style>
+      </p:cxnSp>
+      <p:cxnSp>
+        <p:nvCxnSpPr>
+          <p:cNvPr id="10" name="Straight Connector 9">
+            <a:extLst>
+              <a:ext uri="{FF2B5EF4-FFF2-40B4-BE49-F238E27FC236}">
+                <a16:creationId xmlns:a16="http://schemas.microsoft.com/office/drawing/2014/main" id="{AAE27820-DB3E-2021-2067-9C0F38D46830}"/>
+              </a:ext>
+            </a:extLst>
+          </p:cNvPr>
+          <p:cNvCxnSpPr/>
+          <p:nvPr/>
+        </p:nvCxnSpPr>
+        <p:spPr>
+          <a:xfrm>
+            <a:off x="7270865" y="4436806"/>
+            <a:ext cx="2604655" cy="0"/>
+          </a:xfrm>
+          <a:prstGeom prst="line">
+            <a:avLst/>
+          </a:prstGeom>
+        </p:spPr>
+        <p:style>
+          <a:lnRef idx="1">
+            <a:schemeClr val="accent1"/>
+          </a:lnRef>
+          <a:fillRef idx="0">
+            <a:schemeClr val="accent1"/>
+          </a:fillRef>
+          <a:effectRef idx="0">
+            <a:schemeClr val="accent1"/>
+          </a:effectRef>
+          <a:fontRef idx="minor">
+            <a:schemeClr val="tx1"/>
+          </a:fontRef>
+        </p:style>
+      </p:cxnSp>
+      <p:cxnSp>
+        <p:nvCxnSpPr>
+          <p:cNvPr id="11" name="Straight Connector 10">
+            <a:extLst>
+              <a:ext uri="{FF2B5EF4-FFF2-40B4-BE49-F238E27FC236}">
+                <a16:creationId xmlns:a16="http://schemas.microsoft.com/office/drawing/2014/main" id="{C644AABE-985C-330D-9546-7095952B3A9E}"/>
+              </a:ext>
+            </a:extLst>
+          </p:cNvPr>
+          <p:cNvCxnSpPr/>
+          <p:nvPr/>
+        </p:nvCxnSpPr>
+        <p:spPr>
+          <a:xfrm>
+            <a:off x="7261036" y="4862050"/>
+            <a:ext cx="2604655" cy="0"/>
+          </a:xfrm>
+          <a:prstGeom prst="line">
+            <a:avLst/>
+          </a:prstGeom>
+        </p:spPr>
+        <p:style>
+          <a:lnRef idx="1">
+            <a:schemeClr val="accent1"/>
+          </a:lnRef>
+          <a:fillRef idx="0">
+            <a:schemeClr val="accent1"/>
+          </a:fillRef>
+          <a:effectRef idx="0">
+            <a:schemeClr val="accent1"/>
+          </a:effectRef>
+          <a:fontRef idx="minor">
+            <a:schemeClr val="tx1"/>
+          </a:fontRef>
+        </p:style>
+      </p:cxnSp>
+      <p:cxnSp>
+        <p:nvCxnSpPr>
+          <p:cNvPr id="12" name="Straight Connector 11">
+            <a:extLst>
+              <a:ext uri="{FF2B5EF4-FFF2-40B4-BE49-F238E27FC236}">
+                <a16:creationId xmlns:a16="http://schemas.microsoft.com/office/drawing/2014/main" id="{31385238-D7B2-FE83-C6F1-B87EFE03588C}"/>
+              </a:ext>
+            </a:extLst>
+          </p:cNvPr>
+          <p:cNvCxnSpPr/>
+          <p:nvPr/>
+        </p:nvCxnSpPr>
+        <p:spPr>
+          <a:xfrm>
+            <a:off x="7270865" y="5238135"/>
+            <a:ext cx="2604655" cy="0"/>
+          </a:xfrm>
+          <a:prstGeom prst="line">
+            <a:avLst/>
+          </a:prstGeom>
+        </p:spPr>
+        <p:style>
+          <a:lnRef idx="1">
+            <a:schemeClr val="accent1"/>
+          </a:lnRef>
+          <a:fillRef idx="0">
+            <a:schemeClr val="accent1"/>
+          </a:fillRef>
+          <a:effectRef idx="0">
+            <a:schemeClr val="accent1"/>
+          </a:effectRef>
+          <a:fontRef idx="minor">
+            <a:schemeClr val="tx1"/>
+          </a:fontRef>
+        </p:style>
+      </p:cxnSp>
+      <p:cxnSp>
+        <p:nvCxnSpPr>
+          <p:cNvPr id="13" name="Straight Connector 12">
+            <a:extLst>
+              <a:ext uri="{FF2B5EF4-FFF2-40B4-BE49-F238E27FC236}">
+                <a16:creationId xmlns:a16="http://schemas.microsoft.com/office/drawing/2014/main" id="{516A0985-6361-34A8-5F8B-3713F3494E0D}"/>
+              </a:ext>
+            </a:extLst>
+          </p:cNvPr>
+          <p:cNvCxnSpPr/>
+          <p:nvPr/>
+        </p:nvCxnSpPr>
+        <p:spPr>
+          <a:xfrm>
+            <a:off x="7261036" y="5663379"/>
+            <a:ext cx="2604655" cy="0"/>
+          </a:xfrm>
+          <a:prstGeom prst="line">
+            <a:avLst/>
+          </a:prstGeom>
+        </p:spPr>
+        <p:style>
+          <a:lnRef idx="1">
+            <a:schemeClr val="accent1"/>
+          </a:lnRef>
+          <a:fillRef idx="0">
+            <a:schemeClr val="accent1"/>
+          </a:fillRef>
+          <a:effectRef idx="0">
+            <a:schemeClr val="accent1"/>
+          </a:effectRef>
+          <a:fontRef idx="minor">
+            <a:schemeClr val="tx1"/>
+          </a:fontRef>
+        </p:style>
+      </p:cxnSp>
+      <p:sp>
+        <p:nvSpPr>
+          <p:cNvPr id="14" name="TextBox 13">
+            <a:extLst>
+              <a:ext uri="{FF2B5EF4-FFF2-40B4-BE49-F238E27FC236}">
+                <a16:creationId xmlns:a16="http://schemas.microsoft.com/office/drawing/2014/main" id="{B098126B-6E37-1E15-4BFD-307DDB0E83D2}"/>
+              </a:ext>
+            </a:extLst>
+          </p:cNvPr>
+          <p:cNvSpPr txBox="1"/>
+          <p:nvPr/>
+        </p:nvSpPr>
+        <p:spPr>
+          <a:xfrm>
+            <a:off x="737418" y="2509749"/>
+            <a:ext cx="3620730" cy="369332"/>
+          </a:xfrm>
+          <a:prstGeom prst="rect">
+            <a:avLst/>
+          </a:prstGeom>
+          <a:noFill/>
+        </p:spPr>
+        <p:txBody>
+          <a:bodyPr wrap="square" rtlCol="0">
+            <a:spAutoFit/>
+          </a:bodyPr>
+          <a:lstStyle/>
+          <a:p>
+            <a:r>
+              <a:rPr lang="en-US" strike="sngStrike" dirty="0"/>
+              <a:t>(round)Reference variable a = 0x2f4g</a:t>
+            </a:r>
+          </a:p>
+        </p:txBody>
+      </p:sp>
+      <p:sp>
+        <p:nvSpPr>
+          <p:cNvPr id="16" name="TextBox 15">
+            <a:extLst>
+              <a:ext uri="{FF2B5EF4-FFF2-40B4-BE49-F238E27FC236}">
+                <a16:creationId xmlns:a16="http://schemas.microsoft.com/office/drawing/2014/main" id="{323D5AED-C60E-7660-7C8B-026049B43834}"/>
+              </a:ext>
+            </a:extLst>
+          </p:cNvPr>
+          <p:cNvSpPr txBox="1"/>
+          <p:nvPr/>
+        </p:nvSpPr>
+        <p:spPr>
+          <a:xfrm>
+            <a:off x="7261036" y="3285809"/>
+            <a:ext cx="2251674" cy="369332"/>
+          </a:xfrm>
+          <a:prstGeom prst="rect">
+            <a:avLst/>
+          </a:prstGeom>
+          <a:noFill/>
+        </p:spPr>
+        <p:txBody>
+          <a:bodyPr wrap="square">
+            <a:spAutoFit/>
+          </a:bodyPr>
+          <a:lstStyle/>
+          <a:p>
+            <a:r>
+              <a:rPr lang="en-US" dirty="0"/>
+              <a:t>0x2f4g = round info</a:t>
+            </a:r>
+          </a:p>
+        </p:txBody>
+      </p:sp>
+      <p:cxnSp>
+        <p:nvCxnSpPr>
+          <p:cNvPr id="18" name="Straight Arrow Connector 17">
+            <a:extLst>
+              <a:ext uri="{FF2B5EF4-FFF2-40B4-BE49-F238E27FC236}">
+                <a16:creationId xmlns:a16="http://schemas.microsoft.com/office/drawing/2014/main" id="{F31FDFDD-C178-B5A7-4C10-08FED253EB09}"/>
+              </a:ext>
+            </a:extLst>
+          </p:cNvPr>
+          <p:cNvCxnSpPr>
+            <a:cxnSpLocks/>
+            <a:stCxn id="14" idx="3"/>
+            <a:endCxn id="16" idx="1"/>
+          </p:cNvCxnSpPr>
+          <p:nvPr/>
+        </p:nvCxnSpPr>
+        <p:spPr>
+          <a:xfrm>
+            <a:off x="4358148" y="2694415"/>
+            <a:ext cx="2902888" cy="776060"/>
+          </a:xfrm>
+          <a:prstGeom prst="straightConnector1">
+            <a:avLst/>
+          </a:prstGeom>
+          <a:ln>
+            <a:tailEnd type="triangle"/>
+          </a:ln>
+        </p:spPr>
+        <p:style>
+          <a:lnRef idx="1">
+            <a:schemeClr val="accent1"/>
+          </a:lnRef>
+          <a:fillRef idx="0">
+            <a:schemeClr val="accent1"/>
+          </a:fillRef>
+          <a:effectRef idx="0">
+            <a:schemeClr val="accent1"/>
+          </a:effectRef>
+          <a:fontRef idx="minor">
+            <a:schemeClr val="tx1"/>
+          </a:fontRef>
+        </p:style>
+      </p:cxnSp>
+      <p:sp>
+        <p:nvSpPr>
+          <p:cNvPr id="24" name="TextBox 23">
+            <a:extLst>
+              <a:ext uri="{FF2B5EF4-FFF2-40B4-BE49-F238E27FC236}">
+                <a16:creationId xmlns:a16="http://schemas.microsoft.com/office/drawing/2014/main" id="{B35D46F7-C20F-0BF7-58DC-C9DA2A62572B}"/>
+              </a:ext>
+            </a:extLst>
+          </p:cNvPr>
+          <p:cNvSpPr txBox="1"/>
+          <p:nvPr/>
+        </p:nvSpPr>
+        <p:spPr>
+          <a:xfrm>
+            <a:off x="628651" y="3331267"/>
+            <a:ext cx="2800349" cy="366875"/>
+          </a:xfrm>
+          <a:prstGeom prst="rect">
+            <a:avLst/>
+          </a:prstGeom>
+          <a:noFill/>
+        </p:spPr>
+        <p:txBody>
+          <a:bodyPr wrap="square">
+            <a:spAutoFit/>
+          </a:bodyPr>
+          <a:lstStyle/>
+          <a:p>
+            <a:r>
+              <a:rPr lang="en-US" dirty="0"/>
+              <a:t>Game </a:t>
+            </a:r>
+            <a:r>
+              <a:rPr lang="en-US" dirty="0" err="1"/>
+              <a:t>g.list.add</a:t>
+            </a:r>
+            <a:r>
+              <a:rPr lang="en-US" dirty="0"/>
+              <a:t>(a(0x2f4g));</a:t>
+            </a:r>
+          </a:p>
+        </p:txBody>
+      </p:sp>
+      <p:cxnSp>
+        <p:nvCxnSpPr>
+          <p:cNvPr id="25" name="Straight Arrow Connector 24">
+            <a:extLst>
+              <a:ext uri="{FF2B5EF4-FFF2-40B4-BE49-F238E27FC236}">
+                <a16:creationId xmlns:a16="http://schemas.microsoft.com/office/drawing/2014/main" id="{687E8D59-69DF-4830-C258-C78CA93ED0DB}"/>
+              </a:ext>
+            </a:extLst>
+          </p:cNvPr>
+          <p:cNvCxnSpPr>
+            <a:cxnSpLocks/>
+            <a:stCxn id="24" idx="3"/>
+            <a:endCxn id="16" idx="1"/>
+          </p:cNvCxnSpPr>
+          <p:nvPr/>
+        </p:nvCxnSpPr>
+        <p:spPr>
+          <a:xfrm flipV="1">
+            <a:off x="3429000" y="3470475"/>
+            <a:ext cx="3832036" cy="44230"/>
+          </a:xfrm>
+          <a:prstGeom prst="straightConnector1">
+            <a:avLst/>
+          </a:prstGeom>
+          <a:ln>
+            <a:tailEnd type="triangle"/>
+          </a:ln>
+        </p:spPr>
+        <p:style>
+          <a:lnRef idx="1">
+            <a:schemeClr val="accent1"/>
+          </a:lnRef>
+          <a:fillRef idx="0">
+            <a:schemeClr val="accent1"/>
+          </a:fillRef>
+          <a:effectRef idx="0">
+            <a:schemeClr val="accent1"/>
+          </a:effectRef>
+          <a:fontRef idx="minor">
+            <a:schemeClr val="tx1"/>
+          </a:fontRef>
+        </p:style>
+      </p:cxnSp>
+      <p:sp>
+        <p:nvSpPr>
+          <p:cNvPr id="30" name="TextBox 29">
+            <a:extLst>
+              <a:ext uri="{FF2B5EF4-FFF2-40B4-BE49-F238E27FC236}">
+                <a16:creationId xmlns:a16="http://schemas.microsoft.com/office/drawing/2014/main" id="{69483854-3956-B71A-BD90-C9703E551C50}"/>
+              </a:ext>
+            </a:extLst>
+          </p:cNvPr>
+          <p:cNvSpPr txBox="1"/>
+          <p:nvPr/>
+        </p:nvSpPr>
+        <p:spPr>
+          <a:xfrm>
+            <a:off x="7853736" y="2049564"/>
+            <a:ext cx="1340259" cy="369332"/>
+          </a:xfrm>
+          <a:prstGeom prst="rect">
+            <a:avLst/>
+          </a:prstGeom>
+          <a:noFill/>
+        </p:spPr>
+        <p:txBody>
+          <a:bodyPr wrap="square">
+            <a:spAutoFit/>
+          </a:bodyPr>
+          <a:lstStyle/>
+          <a:p>
+            <a:r>
+              <a:rPr lang="en-US" dirty="0"/>
+              <a:t>HEAP</a:t>
+            </a:r>
+          </a:p>
+        </p:txBody>
+      </p:sp>
+    </p:spTree>
+    <p:extLst>
+      <p:ext uri="{BB962C8B-B14F-4D97-AF65-F5344CB8AC3E}">
+        <p14:creationId xmlns:p14="http://schemas.microsoft.com/office/powerpoint/2010/main" val="1628149462"/>
+      </p:ext>
+    </p:extLst>
+  </p:cSld>
+  <p:clrMapOvr>
+    <a:masterClrMapping/>
+  </p:clrMapOvr>
+</p:sld>
+</file>
+
 <file path=ppt/theme/theme1.xml><?xml version="1.0" encoding="utf-8"?>
 <a:theme xmlns:a="http://schemas.openxmlformats.org/drawingml/2006/main" name="Office Theme">
   <a:themeElements>

</xml_diff>

<commit_message>
adds queries fron SQL demo
</commit_message>
<xml_diff>
--- a/Marks Drawrings.pptx
+++ b/Marks Drawrings.pptx
@@ -8,6 +8,7 @@
     <p:sldId id="256" r:id="rId2"/>
     <p:sldId id="257" r:id="rId3"/>
     <p:sldId id="258" r:id="rId4"/>
+    <p:sldId id="259" r:id="rId5"/>
   </p:sldIdLst>
   <p:sldSz cx="12192000" cy="6858000"/>
   <p:notesSz cx="6858000" cy="9144000"/>
@@ -261,7 +262,7 @@
           <a:p>
             <a:fld id="{5D0E3E9C-DB1F-4A1E-AAB4-85CBF81E55B3}" type="datetimeFigureOut">
               <a:rPr lang="en-US" smtClean="0"/>
-              <a:t>5/9/2023</a:t>
+              <a:t>5/15/2023</a:t>
             </a:fld>
             <a:endParaRPr lang="en-US"/>
           </a:p>
@@ -459,7 +460,7 @@
           <a:p>
             <a:fld id="{5D0E3E9C-DB1F-4A1E-AAB4-85CBF81E55B3}" type="datetimeFigureOut">
               <a:rPr lang="en-US" smtClean="0"/>
-              <a:t>5/9/2023</a:t>
+              <a:t>5/15/2023</a:t>
             </a:fld>
             <a:endParaRPr lang="en-US"/>
           </a:p>
@@ -667,7 +668,7 @@
           <a:p>
             <a:fld id="{5D0E3E9C-DB1F-4A1E-AAB4-85CBF81E55B3}" type="datetimeFigureOut">
               <a:rPr lang="en-US" smtClean="0"/>
-              <a:t>5/9/2023</a:t>
+              <a:t>5/15/2023</a:t>
             </a:fld>
             <a:endParaRPr lang="en-US"/>
           </a:p>
@@ -865,7 +866,7 @@
           <a:p>
             <a:fld id="{5D0E3E9C-DB1F-4A1E-AAB4-85CBF81E55B3}" type="datetimeFigureOut">
               <a:rPr lang="en-US" smtClean="0"/>
-              <a:t>5/9/2023</a:t>
+              <a:t>5/15/2023</a:t>
             </a:fld>
             <a:endParaRPr lang="en-US"/>
           </a:p>
@@ -1140,7 +1141,7 @@
           <a:p>
             <a:fld id="{5D0E3E9C-DB1F-4A1E-AAB4-85CBF81E55B3}" type="datetimeFigureOut">
               <a:rPr lang="en-US" smtClean="0"/>
-              <a:t>5/9/2023</a:t>
+              <a:t>5/15/2023</a:t>
             </a:fld>
             <a:endParaRPr lang="en-US"/>
           </a:p>
@@ -1405,7 +1406,7 @@
           <a:p>
             <a:fld id="{5D0E3E9C-DB1F-4A1E-AAB4-85CBF81E55B3}" type="datetimeFigureOut">
               <a:rPr lang="en-US" smtClean="0"/>
-              <a:t>5/9/2023</a:t>
+              <a:t>5/15/2023</a:t>
             </a:fld>
             <a:endParaRPr lang="en-US"/>
           </a:p>
@@ -1817,7 +1818,7 @@
           <a:p>
             <a:fld id="{5D0E3E9C-DB1F-4A1E-AAB4-85CBF81E55B3}" type="datetimeFigureOut">
               <a:rPr lang="en-US" smtClean="0"/>
-              <a:t>5/9/2023</a:t>
+              <a:t>5/15/2023</a:t>
             </a:fld>
             <a:endParaRPr lang="en-US"/>
           </a:p>
@@ -1958,7 +1959,7 @@
           <a:p>
             <a:fld id="{5D0E3E9C-DB1F-4A1E-AAB4-85CBF81E55B3}" type="datetimeFigureOut">
               <a:rPr lang="en-US" smtClean="0"/>
-              <a:t>5/9/2023</a:t>
+              <a:t>5/15/2023</a:t>
             </a:fld>
             <a:endParaRPr lang="en-US"/>
           </a:p>
@@ -2071,7 +2072,7 @@
           <a:p>
             <a:fld id="{5D0E3E9C-DB1F-4A1E-AAB4-85CBF81E55B3}" type="datetimeFigureOut">
               <a:rPr lang="en-US" smtClean="0"/>
-              <a:t>5/9/2023</a:t>
+              <a:t>5/15/2023</a:t>
             </a:fld>
             <a:endParaRPr lang="en-US"/>
           </a:p>
@@ -2382,7 +2383,7 @@
           <a:p>
             <a:fld id="{5D0E3E9C-DB1F-4A1E-AAB4-85CBF81E55B3}" type="datetimeFigureOut">
               <a:rPr lang="en-US" smtClean="0"/>
-              <a:t>5/9/2023</a:t>
+              <a:t>5/15/2023</a:t>
             </a:fld>
             <a:endParaRPr lang="en-US"/>
           </a:p>
@@ -2670,7 +2671,7 @@
           <a:p>
             <a:fld id="{5D0E3E9C-DB1F-4A1E-AAB4-85CBF81E55B3}" type="datetimeFigureOut">
               <a:rPr lang="en-US" smtClean="0"/>
-              <a:t>5/9/2023</a:t>
+              <a:t>5/15/2023</a:t>
             </a:fld>
             <a:endParaRPr lang="en-US"/>
           </a:p>
@@ -2911,7 +2912,7 @@
           <a:p>
             <a:fld id="{5D0E3E9C-DB1F-4A1E-AAB4-85CBF81E55B3}" type="datetimeFigureOut">
               <a:rPr lang="en-US" smtClean="0"/>
-              <a:t>5/9/2023</a:t>
+              <a:t>5/15/2023</a:t>
             </a:fld>
             <a:endParaRPr lang="en-US"/>
           </a:p>
@@ -4897,6 +4898,766 @@
 </p:sld>
 </file>
 
+<file path=ppt/slides/slide4.xml><?xml version="1.0" encoding="utf-8"?>
+<p:sld xmlns:a="http://schemas.openxmlformats.org/drawingml/2006/main" xmlns:r="http://schemas.openxmlformats.org/officeDocument/2006/relationships" xmlns:p="http://schemas.openxmlformats.org/presentationml/2006/main">
+  <p:cSld>
+    <p:spTree>
+      <p:nvGrpSpPr>
+        <p:cNvPr id="1" name=""/>
+        <p:cNvGrpSpPr/>
+        <p:nvPr/>
+      </p:nvGrpSpPr>
+      <p:grpSpPr>
+        <a:xfrm>
+          <a:off x="0" y="0"/>
+          <a:ext cx="0" cy="0"/>
+          <a:chOff x="0" y="0"/>
+          <a:chExt cx="0" cy="0"/>
+        </a:xfrm>
+      </p:grpSpPr>
+      <p:sp>
+        <p:nvSpPr>
+          <p:cNvPr id="4" name="Rectangle 3">
+            <a:extLst>
+              <a:ext uri="{FF2B5EF4-FFF2-40B4-BE49-F238E27FC236}">
+                <a16:creationId xmlns:a16="http://schemas.microsoft.com/office/drawing/2014/main" id="{925E0518-0251-36A9-6506-68DD1C329C48}"/>
+              </a:ext>
+            </a:extLst>
+          </p:cNvPr>
+          <p:cNvSpPr/>
+          <p:nvPr/>
+        </p:nvSpPr>
+        <p:spPr>
+          <a:xfrm>
+            <a:off x="1110018" y="987188"/>
+            <a:ext cx="2565779" cy="987188"/>
+          </a:xfrm>
+          <a:prstGeom prst="rect">
+            <a:avLst/>
+          </a:prstGeom>
+        </p:spPr>
+        <p:style>
+          <a:lnRef idx="2">
+            <a:schemeClr val="accent1">
+              <a:shade val="50000"/>
+            </a:schemeClr>
+          </a:lnRef>
+          <a:fillRef idx="1">
+            <a:schemeClr val="accent1"/>
+          </a:fillRef>
+          <a:effectRef idx="0">
+            <a:schemeClr val="accent1"/>
+          </a:effectRef>
+          <a:fontRef idx="minor">
+            <a:schemeClr val="lt1"/>
+          </a:fontRef>
+        </p:style>
+        <p:txBody>
+          <a:bodyPr rtlCol="0" anchor="ctr"/>
+          <a:lstStyle/>
+          <a:p>
+            <a:pPr algn="ctr"/>
+            <a:r>
+              <a:rPr lang="en-US" dirty="0"/>
+              <a:t>UI Layer (Console/API)</a:t>
+            </a:r>
+          </a:p>
+        </p:txBody>
+      </p:sp>
+      <p:sp>
+        <p:nvSpPr>
+          <p:cNvPr id="5" name="Rectangle 4">
+            <a:extLst>
+              <a:ext uri="{FF2B5EF4-FFF2-40B4-BE49-F238E27FC236}">
+                <a16:creationId xmlns:a16="http://schemas.microsoft.com/office/drawing/2014/main" id="{EE1EB677-7764-8EC8-0CB1-29FB76F63263}"/>
+              </a:ext>
+            </a:extLst>
+          </p:cNvPr>
+          <p:cNvSpPr/>
+          <p:nvPr/>
+        </p:nvSpPr>
+        <p:spPr>
+          <a:xfrm>
+            <a:off x="1110018" y="2599898"/>
+            <a:ext cx="2565779" cy="987188"/>
+          </a:xfrm>
+          <a:prstGeom prst="rect">
+            <a:avLst/>
+          </a:prstGeom>
+        </p:spPr>
+        <p:style>
+          <a:lnRef idx="2">
+            <a:schemeClr val="accent1">
+              <a:shade val="50000"/>
+            </a:schemeClr>
+          </a:lnRef>
+          <a:fillRef idx="1">
+            <a:schemeClr val="accent1"/>
+          </a:fillRef>
+          <a:effectRef idx="0">
+            <a:schemeClr val="accent1"/>
+          </a:effectRef>
+          <a:fontRef idx="minor">
+            <a:schemeClr val="lt1"/>
+          </a:fontRef>
+        </p:style>
+        <p:txBody>
+          <a:bodyPr rtlCol="0" anchor="ctr"/>
+          <a:lstStyle/>
+          <a:p>
+            <a:pPr algn="ctr"/>
+            <a:r>
+              <a:rPr lang="en-US" dirty="0"/>
+              <a:t>Business Layer</a:t>
+            </a:r>
+          </a:p>
+        </p:txBody>
+      </p:sp>
+      <p:cxnSp>
+        <p:nvCxnSpPr>
+          <p:cNvPr id="7" name="Straight Arrow Connector 6">
+            <a:extLst>
+              <a:ext uri="{FF2B5EF4-FFF2-40B4-BE49-F238E27FC236}">
+                <a16:creationId xmlns:a16="http://schemas.microsoft.com/office/drawing/2014/main" id="{4C0DF9FC-7D5F-6066-DC5E-83A8B64E02FD}"/>
+              </a:ext>
+            </a:extLst>
+          </p:cNvPr>
+          <p:cNvCxnSpPr>
+            <a:stCxn id="4" idx="2"/>
+            <a:endCxn id="5" idx="0"/>
+          </p:cNvCxnSpPr>
+          <p:nvPr/>
+        </p:nvCxnSpPr>
+        <p:spPr>
+          <a:xfrm>
+            <a:off x="2392908" y="1974376"/>
+            <a:ext cx="0" cy="625522"/>
+          </a:xfrm>
+          <a:prstGeom prst="straightConnector1">
+            <a:avLst/>
+          </a:prstGeom>
+          <a:ln w="76200">
+            <a:solidFill>
+              <a:schemeClr val="accent2"/>
+            </a:solidFill>
+            <a:tailEnd type="triangle"/>
+          </a:ln>
+        </p:spPr>
+        <p:style>
+          <a:lnRef idx="1">
+            <a:schemeClr val="accent2"/>
+          </a:lnRef>
+          <a:fillRef idx="0">
+            <a:schemeClr val="accent2"/>
+          </a:fillRef>
+          <a:effectRef idx="0">
+            <a:schemeClr val="accent2"/>
+          </a:effectRef>
+          <a:fontRef idx="minor">
+            <a:schemeClr val="tx1"/>
+          </a:fontRef>
+        </p:style>
+      </p:cxnSp>
+      <p:sp>
+        <p:nvSpPr>
+          <p:cNvPr id="8" name="Rectangle 7">
+            <a:extLst>
+              <a:ext uri="{FF2B5EF4-FFF2-40B4-BE49-F238E27FC236}">
+                <a16:creationId xmlns:a16="http://schemas.microsoft.com/office/drawing/2014/main" id="{7B31A15A-1821-E2FC-60D5-CBA8A0AABD16}"/>
+              </a:ext>
+            </a:extLst>
+          </p:cNvPr>
+          <p:cNvSpPr/>
+          <p:nvPr/>
+        </p:nvSpPr>
+        <p:spPr>
+          <a:xfrm>
+            <a:off x="1110018" y="4212608"/>
+            <a:ext cx="2565779" cy="987188"/>
+          </a:xfrm>
+          <a:prstGeom prst="rect">
+            <a:avLst/>
+          </a:prstGeom>
+        </p:spPr>
+        <p:style>
+          <a:lnRef idx="2">
+            <a:schemeClr val="accent1">
+              <a:shade val="50000"/>
+            </a:schemeClr>
+          </a:lnRef>
+          <a:fillRef idx="1">
+            <a:schemeClr val="accent1"/>
+          </a:fillRef>
+          <a:effectRef idx="0">
+            <a:schemeClr val="accent1"/>
+          </a:effectRef>
+          <a:fontRef idx="minor">
+            <a:schemeClr val="lt1"/>
+          </a:fontRef>
+        </p:style>
+        <p:txBody>
+          <a:bodyPr rtlCol="0" anchor="ctr"/>
+          <a:lstStyle/>
+          <a:p>
+            <a:pPr algn="ctr"/>
+            <a:r>
+              <a:rPr lang="en-US" dirty="0"/>
+              <a:t>Repo Layer </a:t>
+            </a:r>
+          </a:p>
+          <a:p>
+            <a:pPr algn="ctr"/>
+            <a:r>
+              <a:rPr lang="en-US" dirty="0"/>
+              <a:t>ADO.NET</a:t>
+            </a:r>
+          </a:p>
+        </p:txBody>
+      </p:sp>
+      <p:cxnSp>
+        <p:nvCxnSpPr>
+          <p:cNvPr id="9" name="Straight Arrow Connector 8">
+            <a:extLst>
+              <a:ext uri="{FF2B5EF4-FFF2-40B4-BE49-F238E27FC236}">
+                <a16:creationId xmlns:a16="http://schemas.microsoft.com/office/drawing/2014/main" id="{7B04FDAD-18A8-EC1A-22EA-335F53F07CAC}"/>
+              </a:ext>
+            </a:extLst>
+          </p:cNvPr>
+          <p:cNvCxnSpPr>
+            <a:endCxn id="8" idx="0"/>
+          </p:cNvCxnSpPr>
+          <p:nvPr/>
+        </p:nvCxnSpPr>
+        <p:spPr>
+          <a:xfrm>
+            <a:off x="2392908" y="3587086"/>
+            <a:ext cx="0" cy="625522"/>
+          </a:xfrm>
+          <a:prstGeom prst="straightConnector1">
+            <a:avLst/>
+          </a:prstGeom>
+          <a:ln w="76200">
+            <a:solidFill>
+              <a:schemeClr val="accent2"/>
+            </a:solidFill>
+            <a:tailEnd type="triangle"/>
+          </a:ln>
+        </p:spPr>
+        <p:style>
+          <a:lnRef idx="1">
+            <a:schemeClr val="accent2"/>
+          </a:lnRef>
+          <a:fillRef idx="0">
+            <a:schemeClr val="accent2"/>
+          </a:fillRef>
+          <a:effectRef idx="0">
+            <a:schemeClr val="accent2"/>
+          </a:effectRef>
+          <a:fontRef idx="minor">
+            <a:schemeClr val="tx1"/>
+          </a:fontRef>
+        </p:style>
+      </p:cxnSp>
+      <p:sp>
+        <p:nvSpPr>
+          <p:cNvPr id="10" name="Rectangle 9">
+            <a:extLst>
+              <a:ext uri="{FF2B5EF4-FFF2-40B4-BE49-F238E27FC236}">
+                <a16:creationId xmlns:a16="http://schemas.microsoft.com/office/drawing/2014/main" id="{F551F673-E26D-9A14-7EE9-439B56842A41}"/>
+              </a:ext>
+            </a:extLst>
+          </p:cNvPr>
+          <p:cNvSpPr/>
+          <p:nvPr/>
+        </p:nvSpPr>
+        <p:spPr>
+          <a:xfrm>
+            <a:off x="4582653" y="5752567"/>
+            <a:ext cx="2565779" cy="987188"/>
+          </a:xfrm>
+          <a:prstGeom prst="rect">
+            <a:avLst/>
+          </a:prstGeom>
+          <a:solidFill>
+            <a:schemeClr val="accent1">
+              <a:alpha val="52000"/>
+            </a:schemeClr>
+          </a:solidFill>
+          <a:ln>
+            <a:solidFill>
+              <a:schemeClr val="accent1">
+                <a:alpha val="41000"/>
+              </a:schemeClr>
+            </a:solidFill>
+          </a:ln>
+        </p:spPr>
+        <p:style>
+          <a:lnRef idx="2">
+            <a:schemeClr val="accent1">
+              <a:shade val="50000"/>
+            </a:schemeClr>
+          </a:lnRef>
+          <a:fillRef idx="1">
+            <a:schemeClr val="accent1"/>
+          </a:fillRef>
+          <a:effectRef idx="0">
+            <a:schemeClr val="accent1"/>
+          </a:effectRef>
+          <a:fontRef idx="minor">
+            <a:schemeClr val="lt1"/>
+          </a:fontRef>
+        </p:style>
+        <p:txBody>
+          <a:bodyPr rtlCol="0" anchor="ctr"/>
+          <a:lstStyle/>
+          <a:p>
+            <a:pPr algn="ctr"/>
+            <a:r>
+              <a:rPr lang="en-US" dirty="0"/>
+              <a:t>Testing Layer</a:t>
+            </a:r>
+          </a:p>
+        </p:txBody>
+      </p:sp>
+      <p:cxnSp>
+        <p:nvCxnSpPr>
+          <p:cNvPr id="11" name="Straight Arrow Connector 10">
+            <a:extLst>
+              <a:ext uri="{FF2B5EF4-FFF2-40B4-BE49-F238E27FC236}">
+                <a16:creationId xmlns:a16="http://schemas.microsoft.com/office/drawing/2014/main" id="{29E6B351-1177-D88A-421E-CCF2424B6781}"/>
+              </a:ext>
+            </a:extLst>
+          </p:cNvPr>
+          <p:cNvCxnSpPr>
+            <a:cxnSpLocks/>
+            <a:stCxn id="10" idx="1"/>
+            <a:endCxn id="4" idx="3"/>
+          </p:cNvCxnSpPr>
+          <p:nvPr/>
+        </p:nvCxnSpPr>
+        <p:spPr>
+          <a:xfrm flipH="1" flipV="1">
+            <a:off x="3675797" y="1480782"/>
+            <a:ext cx="906856" cy="4765379"/>
+          </a:xfrm>
+          <a:prstGeom prst="straightConnector1">
+            <a:avLst/>
+          </a:prstGeom>
+          <a:ln w="76200">
+            <a:solidFill>
+              <a:schemeClr val="accent1">
+                <a:alpha val="41000"/>
+              </a:schemeClr>
+            </a:solidFill>
+            <a:tailEnd type="triangle"/>
+          </a:ln>
+        </p:spPr>
+        <p:style>
+          <a:lnRef idx="1">
+            <a:schemeClr val="accent2"/>
+          </a:lnRef>
+          <a:fillRef idx="0">
+            <a:schemeClr val="accent2"/>
+          </a:fillRef>
+          <a:effectRef idx="0">
+            <a:schemeClr val="accent2"/>
+          </a:effectRef>
+          <a:fontRef idx="minor">
+            <a:schemeClr val="tx1"/>
+          </a:fontRef>
+        </p:style>
+      </p:cxnSp>
+      <p:cxnSp>
+        <p:nvCxnSpPr>
+          <p:cNvPr id="15" name="Straight Arrow Connector 14">
+            <a:extLst>
+              <a:ext uri="{FF2B5EF4-FFF2-40B4-BE49-F238E27FC236}">
+                <a16:creationId xmlns:a16="http://schemas.microsoft.com/office/drawing/2014/main" id="{B72123C2-83D9-C22F-F924-0416A902CD2B}"/>
+              </a:ext>
+            </a:extLst>
+          </p:cNvPr>
+          <p:cNvCxnSpPr>
+            <a:cxnSpLocks/>
+            <a:stCxn id="10" idx="1"/>
+            <a:endCxn id="5" idx="3"/>
+          </p:cNvCxnSpPr>
+          <p:nvPr/>
+        </p:nvCxnSpPr>
+        <p:spPr>
+          <a:xfrm flipH="1" flipV="1">
+            <a:off x="3675797" y="3093492"/>
+            <a:ext cx="906856" cy="3152669"/>
+          </a:xfrm>
+          <a:prstGeom prst="straightConnector1">
+            <a:avLst/>
+          </a:prstGeom>
+          <a:ln w="76200">
+            <a:solidFill>
+              <a:schemeClr val="accent1">
+                <a:alpha val="41000"/>
+              </a:schemeClr>
+            </a:solidFill>
+            <a:tailEnd type="triangle"/>
+          </a:ln>
+        </p:spPr>
+        <p:style>
+          <a:lnRef idx="1">
+            <a:schemeClr val="accent2"/>
+          </a:lnRef>
+          <a:fillRef idx="0">
+            <a:schemeClr val="accent2"/>
+          </a:fillRef>
+          <a:effectRef idx="0">
+            <a:schemeClr val="accent2"/>
+          </a:effectRef>
+          <a:fontRef idx="minor">
+            <a:schemeClr val="tx1"/>
+          </a:fontRef>
+        </p:style>
+      </p:cxnSp>
+      <p:cxnSp>
+        <p:nvCxnSpPr>
+          <p:cNvPr id="18" name="Straight Arrow Connector 17">
+            <a:extLst>
+              <a:ext uri="{FF2B5EF4-FFF2-40B4-BE49-F238E27FC236}">
+                <a16:creationId xmlns:a16="http://schemas.microsoft.com/office/drawing/2014/main" id="{ABD436BC-6B39-394E-D471-D1AF2FE4B886}"/>
+              </a:ext>
+            </a:extLst>
+          </p:cNvPr>
+          <p:cNvCxnSpPr>
+            <a:cxnSpLocks/>
+            <a:stCxn id="10" idx="1"/>
+            <a:endCxn id="8" idx="3"/>
+          </p:cNvCxnSpPr>
+          <p:nvPr/>
+        </p:nvCxnSpPr>
+        <p:spPr>
+          <a:xfrm flipH="1" flipV="1">
+            <a:off x="3675797" y="4706202"/>
+            <a:ext cx="906856" cy="1539959"/>
+          </a:xfrm>
+          <a:prstGeom prst="straightConnector1">
+            <a:avLst/>
+          </a:prstGeom>
+          <a:ln w="76200">
+            <a:solidFill>
+              <a:schemeClr val="accent1">
+                <a:alpha val="41000"/>
+              </a:schemeClr>
+            </a:solidFill>
+            <a:tailEnd type="triangle"/>
+          </a:ln>
+        </p:spPr>
+        <p:style>
+          <a:lnRef idx="1">
+            <a:schemeClr val="accent2"/>
+          </a:lnRef>
+          <a:fillRef idx="0">
+            <a:schemeClr val="accent2"/>
+          </a:fillRef>
+          <a:effectRef idx="0">
+            <a:schemeClr val="accent2"/>
+          </a:effectRef>
+          <a:fontRef idx="minor">
+            <a:schemeClr val="tx1"/>
+          </a:fontRef>
+        </p:style>
+      </p:cxnSp>
+      <p:sp>
+        <p:nvSpPr>
+          <p:cNvPr id="24" name="Rectangle 23">
+            <a:extLst>
+              <a:ext uri="{FF2B5EF4-FFF2-40B4-BE49-F238E27FC236}">
+                <a16:creationId xmlns:a16="http://schemas.microsoft.com/office/drawing/2014/main" id="{36AF94A1-024E-7197-765D-DD544C011DAB}"/>
+              </a:ext>
+            </a:extLst>
+          </p:cNvPr>
+          <p:cNvSpPr/>
+          <p:nvPr/>
+        </p:nvSpPr>
+        <p:spPr>
+          <a:xfrm>
+            <a:off x="5519941" y="1974376"/>
+            <a:ext cx="2565779" cy="987188"/>
+          </a:xfrm>
+          <a:prstGeom prst="rect">
+            <a:avLst/>
+          </a:prstGeom>
+        </p:spPr>
+        <p:style>
+          <a:lnRef idx="2">
+            <a:schemeClr val="accent1">
+              <a:shade val="50000"/>
+            </a:schemeClr>
+          </a:lnRef>
+          <a:fillRef idx="1">
+            <a:schemeClr val="accent1"/>
+          </a:fillRef>
+          <a:effectRef idx="0">
+            <a:schemeClr val="accent1"/>
+          </a:effectRef>
+          <a:fontRef idx="minor">
+            <a:schemeClr val="lt1"/>
+          </a:fontRef>
+        </p:style>
+        <p:txBody>
+          <a:bodyPr rtlCol="0" anchor="ctr"/>
+          <a:lstStyle/>
+          <a:p>
+            <a:pPr algn="ctr"/>
+            <a:r>
+              <a:rPr lang="en-US" dirty="0"/>
+              <a:t>Models Layer</a:t>
+            </a:r>
+          </a:p>
+        </p:txBody>
+      </p:sp>
+      <p:cxnSp>
+        <p:nvCxnSpPr>
+          <p:cNvPr id="25" name="Straight Arrow Connector 24">
+            <a:extLst>
+              <a:ext uri="{FF2B5EF4-FFF2-40B4-BE49-F238E27FC236}">
+                <a16:creationId xmlns:a16="http://schemas.microsoft.com/office/drawing/2014/main" id="{81654908-D2D8-89D7-0668-7EB199C49716}"/>
+              </a:ext>
+            </a:extLst>
+          </p:cNvPr>
+          <p:cNvCxnSpPr>
+            <a:cxnSpLocks/>
+            <a:stCxn id="4" idx="3"/>
+            <a:endCxn id="24" idx="1"/>
+          </p:cNvCxnSpPr>
+          <p:nvPr/>
+        </p:nvCxnSpPr>
+        <p:spPr>
+          <a:xfrm>
+            <a:off x="3675797" y="1480782"/>
+            <a:ext cx="1844144" cy="987188"/>
+          </a:xfrm>
+          <a:prstGeom prst="straightConnector1">
+            <a:avLst/>
+          </a:prstGeom>
+          <a:ln w="76200">
+            <a:solidFill>
+              <a:schemeClr val="accent2"/>
+            </a:solidFill>
+            <a:tailEnd type="triangle"/>
+          </a:ln>
+        </p:spPr>
+        <p:style>
+          <a:lnRef idx="1">
+            <a:schemeClr val="accent2"/>
+          </a:lnRef>
+          <a:fillRef idx="0">
+            <a:schemeClr val="accent2"/>
+          </a:fillRef>
+          <a:effectRef idx="0">
+            <a:schemeClr val="accent2"/>
+          </a:effectRef>
+          <a:fontRef idx="minor">
+            <a:schemeClr val="tx1"/>
+          </a:fontRef>
+        </p:style>
+      </p:cxnSp>
+      <p:cxnSp>
+        <p:nvCxnSpPr>
+          <p:cNvPr id="28" name="Straight Arrow Connector 27">
+            <a:extLst>
+              <a:ext uri="{FF2B5EF4-FFF2-40B4-BE49-F238E27FC236}">
+                <a16:creationId xmlns:a16="http://schemas.microsoft.com/office/drawing/2014/main" id="{276C9FFC-F33A-0D17-C973-5D6EB28619C9}"/>
+              </a:ext>
+            </a:extLst>
+          </p:cNvPr>
+          <p:cNvCxnSpPr>
+            <a:cxnSpLocks/>
+            <a:stCxn id="5" idx="3"/>
+            <a:endCxn id="24" idx="1"/>
+          </p:cNvCxnSpPr>
+          <p:nvPr/>
+        </p:nvCxnSpPr>
+        <p:spPr>
+          <a:xfrm flipV="1">
+            <a:off x="3675797" y="2467970"/>
+            <a:ext cx="1844144" cy="625522"/>
+          </a:xfrm>
+          <a:prstGeom prst="straightConnector1">
+            <a:avLst/>
+          </a:prstGeom>
+          <a:ln w="76200">
+            <a:solidFill>
+              <a:schemeClr val="accent2"/>
+            </a:solidFill>
+            <a:tailEnd type="triangle"/>
+          </a:ln>
+        </p:spPr>
+        <p:style>
+          <a:lnRef idx="1">
+            <a:schemeClr val="accent2"/>
+          </a:lnRef>
+          <a:fillRef idx="0">
+            <a:schemeClr val="accent2"/>
+          </a:fillRef>
+          <a:effectRef idx="0">
+            <a:schemeClr val="accent2"/>
+          </a:effectRef>
+          <a:fontRef idx="minor">
+            <a:schemeClr val="tx1"/>
+          </a:fontRef>
+        </p:style>
+      </p:cxnSp>
+      <p:cxnSp>
+        <p:nvCxnSpPr>
+          <p:cNvPr id="31" name="Straight Arrow Connector 30">
+            <a:extLst>
+              <a:ext uri="{FF2B5EF4-FFF2-40B4-BE49-F238E27FC236}">
+                <a16:creationId xmlns:a16="http://schemas.microsoft.com/office/drawing/2014/main" id="{63B0C11E-7E75-8CB4-E474-37FABCF3EF62}"/>
+              </a:ext>
+            </a:extLst>
+          </p:cNvPr>
+          <p:cNvCxnSpPr>
+            <a:cxnSpLocks/>
+            <a:stCxn id="8" idx="3"/>
+            <a:endCxn id="24" idx="1"/>
+          </p:cNvCxnSpPr>
+          <p:nvPr/>
+        </p:nvCxnSpPr>
+        <p:spPr>
+          <a:xfrm flipV="1">
+            <a:off x="3675797" y="2467970"/>
+            <a:ext cx="1844144" cy="2238232"/>
+          </a:xfrm>
+          <a:prstGeom prst="straightConnector1">
+            <a:avLst/>
+          </a:prstGeom>
+          <a:ln w="76200">
+            <a:solidFill>
+              <a:schemeClr val="accent2"/>
+            </a:solidFill>
+            <a:tailEnd type="triangle"/>
+          </a:ln>
+        </p:spPr>
+        <p:style>
+          <a:lnRef idx="1">
+            <a:schemeClr val="accent2"/>
+          </a:lnRef>
+          <a:fillRef idx="0">
+            <a:schemeClr val="accent2"/>
+          </a:fillRef>
+          <a:effectRef idx="0">
+            <a:schemeClr val="accent2"/>
+          </a:effectRef>
+          <a:fontRef idx="minor">
+            <a:schemeClr val="tx1"/>
+          </a:fontRef>
+        </p:style>
+      </p:cxnSp>
+      <p:sp>
+        <p:nvSpPr>
+          <p:cNvPr id="34" name="Left Brace 33">
+            <a:extLst>
+              <a:ext uri="{FF2B5EF4-FFF2-40B4-BE49-F238E27FC236}">
+                <a16:creationId xmlns:a16="http://schemas.microsoft.com/office/drawing/2014/main" id="{02A00AE7-36DA-E19A-CE98-901F2E4AFBDB}"/>
+              </a:ext>
+            </a:extLst>
+          </p:cNvPr>
+          <p:cNvSpPr/>
+          <p:nvPr/>
+        </p:nvSpPr>
+        <p:spPr>
+          <a:xfrm rot="5400000">
+            <a:off x="5360301" y="-4270489"/>
+            <a:ext cx="1193530" cy="10249833"/>
+          </a:xfrm>
+          <a:prstGeom prst="leftBrace">
+            <a:avLst>
+              <a:gd name="adj1" fmla="val 8333"/>
+              <a:gd name="adj2" fmla="val 50189"/>
+            </a:avLst>
+          </a:prstGeom>
+          <a:ln w="31750">
+            <a:solidFill>
+              <a:schemeClr val="accent2"/>
+            </a:solidFill>
+          </a:ln>
+        </p:spPr>
+        <p:style>
+          <a:lnRef idx="1">
+            <a:schemeClr val="accent1"/>
+          </a:lnRef>
+          <a:fillRef idx="0">
+            <a:schemeClr val="accent1"/>
+          </a:fillRef>
+          <a:effectRef idx="0">
+            <a:schemeClr val="accent1"/>
+          </a:effectRef>
+          <a:fontRef idx="minor">
+            <a:schemeClr val="tx1"/>
+          </a:fontRef>
+        </p:style>
+        <p:txBody>
+          <a:bodyPr rtlCol="0" anchor="ctr"/>
+          <a:lstStyle/>
+          <a:p>
+            <a:pPr algn="ctr"/>
+            <a:endParaRPr lang="en-US"/>
+          </a:p>
+        </p:txBody>
+      </p:sp>
+      <p:sp>
+        <p:nvSpPr>
+          <p:cNvPr id="35" name="TextBox 34">
+            <a:extLst>
+              <a:ext uri="{FF2B5EF4-FFF2-40B4-BE49-F238E27FC236}">
+                <a16:creationId xmlns:a16="http://schemas.microsoft.com/office/drawing/2014/main" id="{70E78820-F3B1-1DD8-CFDE-C3DBA57C2F2E}"/>
+              </a:ext>
+            </a:extLst>
+          </p:cNvPr>
+          <p:cNvSpPr txBox="1"/>
+          <p:nvPr/>
+        </p:nvSpPr>
+        <p:spPr>
+          <a:xfrm>
+            <a:off x="4495962" y="361666"/>
+            <a:ext cx="1509485" cy="369332"/>
+          </a:xfrm>
+          <a:prstGeom prst="rect">
+            <a:avLst/>
+          </a:prstGeom>
+          <a:noFill/>
+        </p:spPr>
+        <p:txBody>
+          <a:bodyPr wrap="square" rtlCol="0" anchor="ctr">
+            <a:spAutoFit/>
+          </a:bodyPr>
+          <a:lstStyle/>
+          <a:p>
+            <a:r>
+              <a:rPr lang="en-US" dirty="0"/>
+              <a:t>Solution (.</a:t>
+            </a:r>
+            <a:r>
+              <a:rPr lang="en-US" dirty="0" err="1"/>
+              <a:t>sln</a:t>
+            </a:r>
+            <a:r>
+              <a:rPr lang="en-US" dirty="0"/>
+              <a:t>)</a:t>
+            </a:r>
+          </a:p>
+        </p:txBody>
+      </p:sp>
+    </p:spTree>
+    <p:extLst>
+      <p:ext uri="{BB962C8B-B14F-4D97-AF65-F5344CB8AC3E}">
+        <p14:creationId xmlns:p14="http://schemas.microsoft.com/office/powerpoint/2010/main" val="473719833"/>
+      </p:ext>
+    </p:extLst>
+  </p:cSld>
+  <p:clrMapOvr>
+    <a:masterClrMapping/>
+  </p:clrMapOvr>
+</p:sld>
+</file>
+
 <file path=ppt/theme/theme1.xml><?xml version="1.0" encoding="utf-8"?>
 <a:theme xmlns:a="http://schemas.openxmlformats.org/drawingml/2006/main" name="Office Theme">
   <a:themeElements>

</xml_diff>

<commit_message>
adds some drawrings and stored procedures and SQL functions
</commit_message>
<xml_diff>
--- a/Marks Drawrings.pptx
+++ b/Marks Drawrings.pptx
@@ -9,6 +9,8 @@
     <p:sldId id="257" r:id="rId3"/>
     <p:sldId id="258" r:id="rId4"/>
     <p:sldId id="259" r:id="rId5"/>
+    <p:sldId id="260" r:id="rId6"/>
+    <p:sldId id="261" r:id="rId7"/>
   </p:sldIdLst>
   <p:sldSz cx="12192000" cy="6858000"/>
   <p:notesSz cx="6858000" cy="9144000"/>
@@ -262,7 +264,7 @@
           <a:p>
             <a:fld id="{5D0E3E9C-DB1F-4A1E-AAB4-85CBF81E55B3}" type="datetimeFigureOut">
               <a:rPr lang="en-US" smtClean="0"/>
-              <a:t>5/15/2023</a:t>
+              <a:t>5/17/2023</a:t>
             </a:fld>
             <a:endParaRPr lang="en-US"/>
           </a:p>
@@ -460,7 +462,7 @@
           <a:p>
             <a:fld id="{5D0E3E9C-DB1F-4A1E-AAB4-85CBF81E55B3}" type="datetimeFigureOut">
               <a:rPr lang="en-US" smtClean="0"/>
-              <a:t>5/15/2023</a:t>
+              <a:t>5/17/2023</a:t>
             </a:fld>
             <a:endParaRPr lang="en-US"/>
           </a:p>
@@ -668,7 +670,7 @@
           <a:p>
             <a:fld id="{5D0E3E9C-DB1F-4A1E-AAB4-85CBF81E55B3}" type="datetimeFigureOut">
               <a:rPr lang="en-US" smtClean="0"/>
-              <a:t>5/15/2023</a:t>
+              <a:t>5/17/2023</a:t>
             </a:fld>
             <a:endParaRPr lang="en-US"/>
           </a:p>
@@ -866,7 +868,7 @@
           <a:p>
             <a:fld id="{5D0E3E9C-DB1F-4A1E-AAB4-85CBF81E55B3}" type="datetimeFigureOut">
               <a:rPr lang="en-US" smtClean="0"/>
-              <a:t>5/15/2023</a:t>
+              <a:t>5/17/2023</a:t>
             </a:fld>
             <a:endParaRPr lang="en-US"/>
           </a:p>
@@ -1141,7 +1143,7 @@
           <a:p>
             <a:fld id="{5D0E3E9C-DB1F-4A1E-AAB4-85CBF81E55B3}" type="datetimeFigureOut">
               <a:rPr lang="en-US" smtClean="0"/>
-              <a:t>5/15/2023</a:t>
+              <a:t>5/17/2023</a:t>
             </a:fld>
             <a:endParaRPr lang="en-US"/>
           </a:p>
@@ -1406,7 +1408,7 @@
           <a:p>
             <a:fld id="{5D0E3E9C-DB1F-4A1E-AAB4-85CBF81E55B3}" type="datetimeFigureOut">
               <a:rPr lang="en-US" smtClean="0"/>
-              <a:t>5/15/2023</a:t>
+              <a:t>5/17/2023</a:t>
             </a:fld>
             <a:endParaRPr lang="en-US"/>
           </a:p>
@@ -1818,7 +1820,7 @@
           <a:p>
             <a:fld id="{5D0E3E9C-DB1F-4A1E-AAB4-85CBF81E55B3}" type="datetimeFigureOut">
               <a:rPr lang="en-US" smtClean="0"/>
-              <a:t>5/15/2023</a:t>
+              <a:t>5/17/2023</a:t>
             </a:fld>
             <a:endParaRPr lang="en-US"/>
           </a:p>
@@ -1959,7 +1961,7 @@
           <a:p>
             <a:fld id="{5D0E3E9C-DB1F-4A1E-AAB4-85CBF81E55B3}" type="datetimeFigureOut">
               <a:rPr lang="en-US" smtClean="0"/>
-              <a:t>5/15/2023</a:t>
+              <a:t>5/17/2023</a:t>
             </a:fld>
             <a:endParaRPr lang="en-US"/>
           </a:p>
@@ -2072,7 +2074,7 @@
           <a:p>
             <a:fld id="{5D0E3E9C-DB1F-4A1E-AAB4-85CBF81E55B3}" type="datetimeFigureOut">
               <a:rPr lang="en-US" smtClean="0"/>
-              <a:t>5/15/2023</a:t>
+              <a:t>5/17/2023</a:t>
             </a:fld>
             <a:endParaRPr lang="en-US"/>
           </a:p>
@@ -2383,7 +2385,7 @@
           <a:p>
             <a:fld id="{5D0E3E9C-DB1F-4A1E-AAB4-85CBF81E55B3}" type="datetimeFigureOut">
               <a:rPr lang="en-US" smtClean="0"/>
-              <a:t>5/15/2023</a:t>
+              <a:t>5/17/2023</a:t>
             </a:fld>
             <a:endParaRPr lang="en-US"/>
           </a:p>
@@ -2671,7 +2673,7 @@
           <a:p>
             <a:fld id="{5D0E3E9C-DB1F-4A1E-AAB4-85CBF81E55B3}" type="datetimeFigureOut">
               <a:rPr lang="en-US" smtClean="0"/>
-              <a:t>5/15/2023</a:t>
+              <a:t>5/17/2023</a:t>
             </a:fld>
             <a:endParaRPr lang="en-US"/>
           </a:p>
@@ -2912,7 +2914,7 @@
           <a:p>
             <a:fld id="{5D0E3E9C-DB1F-4A1E-AAB4-85CBF81E55B3}" type="datetimeFigureOut">
               <a:rPr lang="en-US" smtClean="0"/>
-              <a:t>5/15/2023</a:t>
+              <a:t>5/17/2023</a:t>
             </a:fld>
             <a:endParaRPr lang="en-US"/>
           </a:p>
@@ -5658,6 +5660,1086 @@
 </p:sld>
 </file>
 
+<file path=ppt/slides/slide5.xml><?xml version="1.0" encoding="utf-8"?>
+<p:sld xmlns:a="http://schemas.openxmlformats.org/drawingml/2006/main" xmlns:r="http://schemas.openxmlformats.org/officeDocument/2006/relationships" xmlns:p="http://schemas.openxmlformats.org/presentationml/2006/main">
+  <p:cSld>
+    <p:spTree>
+      <p:nvGrpSpPr>
+        <p:cNvPr id="1" name=""/>
+        <p:cNvGrpSpPr/>
+        <p:nvPr/>
+      </p:nvGrpSpPr>
+      <p:grpSpPr>
+        <a:xfrm>
+          <a:off x="0" y="0"/>
+          <a:ext cx="0" cy="0"/>
+          <a:chOff x="0" y="0"/>
+          <a:chExt cx="0" cy="0"/>
+        </a:xfrm>
+      </p:grpSpPr>
+      <p:sp>
+        <p:nvSpPr>
+          <p:cNvPr id="5" name="Rectangle 4">
+            <a:extLst>
+              <a:ext uri="{FF2B5EF4-FFF2-40B4-BE49-F238E27FC236}">
+                <a16:creationId xmlns:a16="http://schemas.microsoft.com/office/drawing/2014/main" id="{1569D167-11F8-A8F1-0975-7ACD57DDD71E}"/>
+              </a:ext>
+            </a:extLst>
+          </p:cNvPr>
+          <p:cNvSpPr/>
+          <p:nvPr/>
+        </p:nvSpPr>
+        <p:spPr>
+          <a:xfrm>
+            <a:off x="3889611" y="1521725"/>
+            <a:ext cx="2734101" cy="636897"/>
+          </a:xfrm>
+          <a:prstGeom prst="rect">
+            <a:avLst/>
+          </a:prstGeom>
+        </p:spPr>
+        <p:style>
+          <a:lnRef idx="2">
+            <a:schemeClr val="accent1">
+              <a:shade val="50000"/>
+            </a:schemeClr>
+          </a:lnRef>
+          <a:fillRef idx="1">
+            <a:schemeClr val="accent1"/>
+          </a:fillRef>
+          <a:effectRef idx="0">
+            <a:schemeClr val="accent1"/>
+          </a:effectRef>
+          <a:fontRef idx="minor">
+            <a:schemeClr val="lt1"/>
+          </a:fontRef>
+        </p:style>
+        <p:txBody>
+          <a:bodyPr rtlCol="0" anchor="ctr"/>
+          <a:lstStyle/>
+          <a:p>
+            <a:pPr algn="ctr"/>
+            <a:r>
+              <a:rPr lang="en-US" dirty="0"/>
+              <a:t>Customer/Address Junction</a:t>
+            </a:r>
+          </a:p>
+        </p:txBody>
+      </p:sp>
+      <p:sp>
+        <p:nvSpPr>
+          <p:cNvPr id="6" name="Rectangle 5">
+            <a:extLst>
+              <a:ext uri="{FF2B5EF4-FFF2-40B4-BE49-F238E27FC236}">
+                <a16:creationId xmlns:a16="http://schemas.microsoft.com/office/drawing/2014/main" id="{CA22B440-B809-64C6-03CF-8BE520C81D5A}"/>
+              </a:ext>
+            </a:extLst>
+          </p:cNvPr>
+          <p:cNvSpPr/>
+          <p:nvPr/>
+        </p:nvSpPr>
+        <p:spPr>
+          <a:xfrm>
+            <a:off x="5354471" y="5431808"/>
+            <a:ext cx="1701422" cy="636897"/>
+          </a:xfrm>
+          <a:prstGeom prst="rect">
+            <a:avLst/>
+          </a:prstGeom>
+        </p:spPr>
+        <p:style>
+          <a:lnRef idx="2">
+            <a:schemeClr val="accent1">
+              <a:shade val="50000"/>
+            </a:schemeClr>
+          </a:lnRef>
+          <a:fillRef idx="1">
+            <a:schemeClr val="accent1"/>
+          </a:fillRef>
+          <a:effectRef idx="0">
+            <a:schemeClr val="accent1"/>
+          </a:effectRef>
+          <a:fontRef idx="minor">
+            <a:schemeClr val="lt1"/>
+          </a:fontRef>
+        </p:style>
+        <p:txBody>
+          <a:bodyPr rtlCol="0" anchor="ctr"/>
+          <a:lstStyle/>
+          <a:p>
+            <a:pPr algn="ctr"/>
+            <a:r>
+              <a:rPr lang="en-US" dirty="0"/>
+              <a:t>Orders</a:t>
+            </a:r>
+          </a:p>
+        </p:txBody>
+      </p:sp>
+      <p:sp>
+        <p:nvSpPr>
+          <p:cNvPr id="7" name="Rectangle 6">
+            <a:extLst>
+              <a:ext uri="{FF2B5EF4-FFF2-40B4-BE49-F238E27FC236}">
+                <a16:creationId xmlns:a16="http://schemas.microsoft.com/office/drawing/2014/main" id="{AC02BAD9-FD01-D7CB-334A-B8A28FB43298}"/>
+              </a:ext>
+            </a:extLst>
+          </p:cNvPr>
+          <p:cNvSpPr/>
+          <p:nvPr/>
+        </p:nvSpPr>
+        <p:spPr>
+          <a:xfrm>
+            <a:off x="8227325" y="3058235"/>
+            <a:ext cx="1701422" cy="636897"/>
+          </a:xfrm>
+          <a:prstGeom prst="rect">
+            <a:avLst/>
+          </a:prstGeom>
+        </p:spPr>
+        <p:style>
+          <a:lnRef idx="2">
+            <a:schemeClr val="accent1">
+              <a:shade val="50000"/>
+            </a:schemeClr>
+          </a:lnRef>
+          <a:fillRef idx="1">
+            <a:schemeClr val="accent1"/>
+          </a:fillRef>
+          <a:effectRef idx="0">
+            <a:schemeClr val="accent1"/>
+          </a:effectRef>
+          <a:fontRef idx="minor">
+            <a:schemeClr val="lt1"/>
+          </a:fontRef>
+        </p:style>
+        <p:txBody>
+          <a:bodyPr rtlCol="0" anchor="ctr"/>
+          <a:lstStyle/>
+          <a:p>
+            <a:pPr algn="ctr"/>
+            <a:r>
+              <a:rPr lang="en-US" dirty="0"/>
+              <a:t>Customers</a:t>
+            </a:r>
+          </a:p>
+        </p:txBody>
+      </p:sp>
+      <p:sp>
+        <p:nvSpPr>
+          <p:cNvPr id="8" name="Rectangle 7">
+            <a:extLst>
+              <a:ext uri="{FF2B5EF4-FFF2-40B4-BE49-F238E27FC236}">
+                <a16:creationId xmlns:a16="http://schemas.microsoft.com/office/drawing/2014/main" id="{2A86C65B-B798-7967-EA38-929277B79ACF}"/>
+              </a:ext>
+            </a:extLst>
+          </p:cNvPr>
+          <p:cNvSpPr/>
+          <p:nvPr/>
+        </p:nvSpPr>
+        <p:spPr>
+          <a:xfrm>
+            <a:off x="1760561" y="3050842"/>
+            <a:ext cx="1701422" cy="636897"/>
+          </a:xfrm>
+          <a:prstGeom prst="rect">
+            <a:avLst/>
+          </a:prstGeom>
+        </p:spPr>
+        <p:style>
+          <a:lnRef idx="2">
+            <a:schemeClr val="accent1">
+              <a:shade val="50000"/>
+            </a:schemeClr>
+          </a:lnRef>
+          <a:fillRef idx="1">
+            <a:schemeClr val="accent1"/>
+          </a:fillRef>
+          <a:effectRef idx="0">
+            <a:schemeClr val="accent1"/>
+          </a:effectRef>
+          <a:fontRef idx="minor">
+            <a:schemeClr val="lt1"/>
+          </a:fontRef>
+        </p:style>
+        <p:txBody>
+          <a:bodyPr rtlCol="0" anchor="ctr"/>
+          <a:lstStyle/>
+          <a:p>
+            <a:pPr algn="ctr"/>
+            <a:r>
+              <a:rPr lang="en-US" dirty="0"/>
+              <a:t>Addresses</a:t>
+            </a:r>
+          </a:p>
+        </p:txBody>
+      </p:sp>
+      <p:cxnSp>
+        <p:nvCxnSpPr>
+          <p:cNvPr id="10" name="Straight Arrow Connector 9">
+            <a:extLst>
+              <a:ext uri="{FF2B5EF4-FFF2-40B4-BE49-F238E27FC236}">
+                <a16:creationId xmlns:a16="http://schemas.microsoft.com/office/drawing/2014/main" id="{4BD54198-F099-FA08-A113-3E12C8304D1E}"/>
+              </a:ext>
+            </a:extLst>
+          </p:cNvPr>
+          <p:cNvCxnSpPr>
+            <a:stCxn id="5" idx="2"/>
+            <a:endCxn id="7" idx="1"/>
+          </p:cNvCxnSpPr>
+          <p:nvPr/>
+        </p:nvCxnSpPr>
+        <p:spPr>
+          <a:xfrm>
+            <a:off x="5256662" y="2158622"/>
+            <a:ext cx="2970663" cy="1218062"/>
+          </a:xfrm>
+          <a:prstGeom prst="straightConnector1">
+            <a:avLst/>
+          </a:prstGeom>
+          <a:ln w="76200">
+            <a:tailEnd type="triangle"/>
+          </a:ln>
+        </p:spPr>
+        <p:style>
+          <a:lnRef idx="1">
+            <a:schemeClr val="accent1"/>
+          </a:lnRef>
+          <a:fillRef idx="0">
+            <a:schemeClr val="accent1"/>
+          </a:fillRef>
+          <a:effectRef idx="0">
+            <a:schemeClr val="accent1"/>
+          </a:effectRef>
+          <a:fontRef idx="minor">
+            <a:schemeClr val="tx1"/>
+          </a:fontRef>
+        </p:style>
+      </p:cxnSp>
+      <p:cxnSp>
+        <p:nvCxnSpPr>
+          <p:cNvPr id="11" name="Straight Arrow Connector 10">
+            <a:extLst>
+              <a:ext uri="{FF2B5EF4-FFF2-40B4-BE49-F238E27FC236}">
+                <a16:creationId xmlns:a16="http://schemas.microsoft.com/office/drawing/2014/main" id="{89572CA5-E4C3-DBBB-D3B7-9A9D65003688}"/>
+              </a:ext>
+            </a:extLst>
+          </p:cNvPr>
+          <p:cNvCxnSpPr>
+            <a:cxnSpLocks/>
+            <a:stCxn id="5" idx="2"/>
+            <a:endCxn id="8" idx="3"/>
+          </p:cNvCxnSpPr>
+          <p:nvPr/>
+        </p:nvCxnSpPr>
+        <p:spPr>
+          <a:xfrm flipH="1">
+            <a:off x="3461983" y="2158622"/>
+            <a:ext cx="1794679" cy="1210669"/>
+          </a:xfrm>
+          <a:prstGeom prst="straightConnector1">
+            <a:avLst/>
+          </a:prstGeom>
+          <a:ln w="76200">
+            <a:tailEnd type="triangle"/>
+          </a:ln>
+        </p:spPr>
+        <p:style>
+          <a:lnRef idx="1">
+            <a:schemeClr val="accent1"/>
+          </a:lnRef>
+          <a:fillRef idx="0">
+            <a:schemeClr val="accent1"/>
+          </a:fillRef>
+          <a:effectRef idx="0">
+            <a:schemeClr val="accent1"/>
+          </a:effectRef>
+          <a:fontRef idx="minor">
+            <a:schemeClr val="tx1"/>
+          </a:fontRef>
+        </p:style>
+      </p:cxnSp>
+      <p:cxnSp>
+        <p:nvCxnSpPr>
+          <p:cNvPr id="14" name="Straight Arrow Connector 13">
+            <a:extLst>
+              <a:ext uri="{FF2B5EF4-FFF2-40B4-BE49-F238E27FC236}">
+                <a16:creationId xmlns:a16="http://schemas.microsoft.com/office/drawing/2014/main" id="{1BB250AE-6745-C58D-E315-4BCAB351302E}"/>
+              </a:ext>
+            </a:extLst>
+          </p:cNvPr>
+          <p:cNvCxnSpPr>
+            <a:cxnSpLocks/>
+            <a:stCxn id="6" idx="0"/>
+            <a:endCxn id="7" idx="1"/>
+          </p:cNvCxnSpPr>
+          <p:nvPr/>
+        </p:nvCxnSpPr>
+        <p:spPr>
+          <a:xfrm flipV="1">
+            <a:off x="6205182" y="3376684"/>
+            <a:ext cx="2022143" cy="2055124"/>
+          </a:xfrm>
+          <a:prstGeom prst="straightConnector1">
+            <a:avLst/>
+          </a:prstGeom>
+          <a:ln w="76200">
+            <a:tailEnd type="triangle"/>
+          </a:ln>
+        </p:spPr>
+        <p:style>
+          <a:lnRef idx="1">
+            <a:schemeClr val="accent1"/>
+          </a:lnRef>
+          <a:fillRef idx="0">
+            <a:schemeClr val="accent1"/>
+          </a:fillRef>
+          <a:effectRef idx="0">
+            <a:schemeClr val="accent1"/>
+          </a:effectRef>
+          <a:fontRef idx="minor">
+            <a:schemeClr val="tx1"/>
+          </a:fontRef>
+        </p:style>
+      </p:cxnSp>
+    </p:spTree>
+    <p:extLst>
+      <p:ext uri="{BB962C8B-B14F-4D97-AF65-F5344CB8AC3E}">
+        <p14:creationId xmlns:p14="http://schemas.microsoft.com/office/powerpoint/2010/main" val="4219161035"/>
+      </p:ext>
+    </p:extLst>
+  </p:cSld>
+  <p:clrMapOvr>
+    <a:masterClrMapping/>
+  </p:clrMapOvr>
+</p:sld>
+</file>
+
+<file path=ppt/slides/slide6.xml><?xml version="1.0" encoding="utf-8"?>
+<p:sld xmlns:a="http://schemas.openxmlformats.org/drawingml/2006/main" xmlns:r="http://schemas.openxmlformats.org/officeDocument/2006/relationships" xmlns:p="http://schemas.openxmlformats.org/presentationml/2006/main">
+  <p:cSld>
+    <p:spTree>
+      <p:nvGrpSpPr>
+        <p:cNvPr id="1" name=""/>
+        <p:cNvGrpSpPr/>
+        <p:nvPr/>
+      </p:nvGrpSpPr>
+      <p:grpSpPr>
+        <a:xfrm>
+          <a:off x="0" y="0"/>
+          <a:ext cx="0" cy="0"/>
+          <a:chOff x="0" y="0"/>
+          <a:chExt cx="0" cy="0"/>
+        </a:xfrm>
+      </p:grpSpPr>
+      <p:sp>
+        <p:nvSpPr>
+          <p:cNvPr id="5" name="Rectangle 4">
+            <a:extLst>
+              <a:ext uri="{FF2B5EF4-FFF2-40B4-BE49-F238E27FC236}">
+                <a16:creationId xmlns:a16="http://schemas.microsoft.com/office/drawing/2014/main" id="{6121F2AB-6AB0-6893-F283-6AB968491DDF}"/>
+              </a:ext>
+            </a:extLst>
+          </p:cNvPr>
+          <p:cNvSpPr/>
+          <p:nvPr/>
+        </p:nvSpPr>
+        <p:spPr>
+          <a:xfrm>
+            <a:off x="1162334" y="2882523"/>
+            <a:ext cx="2597624" cy="1789561"/>
+          </a:xfrm>
+          <a:prstGeom prst="rect">
+            <a:avLst/>
+          </a:prstGeom>
+        </p:spPr>
+        <p:style>
+          <a:lnRef idx="2">
+            <a:schemeClr val="accent1">
+              <a:shade val="50000"/>
+            </a:schemeClr>
+          </a:lnRef>
+          <a:fillRef idx="1">
+            <a:schemeClr val="accent1"/>
+          </a:fillRef>
+          <a:effectRef idx="0">
+            <a:schemeClr val="accent1"/>
+          </a:effectRef>
+          <a:fontRef idx="minor">
+            <a:schemeClr val="lt1"/>
+          </a:fontRef>
+        </p:style>
+        <p:txBody>
+          <a:bodyPr rtlCol="0" anchor="t"/>
+          <a:lstStyle/>
+          <a:p>
+            <a:r>
+              <a:rPr lang="en-US" dirty="0"/>
+              <a:t>Store</a:t>
+            </a:r>
+          </a:p>
+          <a:p>
+            <a:pPr marL="285750" indent="-285750">
+              <a:buFontTx/>
+              <a:buChar char="-"/>
+            </a:pPr>
+            <a:r>
+              <a:rPr lang="en-US" dirty="0" err="1"/>
+              <a:t>StoreId</a:t>
+            </a:r>
+            <a:endParaRPr lang="en-US" dirty="0"/>
+          </a:p>
+          <a:p>
+            <a:pPr marL="285750" indent="-285750">
+              <a:buFontTx/>
+              <a:buChar char="-"/>
+            </a:pPr>
+            <a:r>
+              <a:rPr lang="en-US" dirty="0"/>
+              <a:t>Location</a:t>
+            </a:r>
+          </a:p>
+          <a:p>
+            <a:pPr marL="285750" indent="-285750">
+              <a:buFontTx/>
+              <a:buChar char="-"/>
+            </a:pPr>
+            <a:r>
+              <a:rPr lang="en-US" dirty="0"/>
+              <a:t>Manager</a:t>
+            </a:r>
+          </a:p>
+          <a:p>
+            <a:pPr marL="285750" indent="-285750">
+              <a:buFontTx/>
+              <a:buChar char="-"/>
+            </a:pPr>
+            <a:endParaRPr lang="en-US" dirty="0"/>
+          </a:p>
+          <a:p>
+            <a:pPr marL="285750" indent="-285750">
+              <a:buFontTx/>
+              <a:buChar char="-"/>
+            </a:pPr>
+            <a:endParaRPr lang="en-US" dirty="0"/>
+          </a:p>
+          <a:p>
+            <a:pPr marL="285750" indent="-285750">
+              <a:buFontTx/>
+              <a:buChar char="-"/>
+            </a:pPr>
+            <a:endParaRPr lang="en-US" dirty="0"/>
+          </a:p>
+        </p:txBody>
+      </p:sp>
+      <p:sp>
+        <p:nvSpPr>
+          <p:cNvPr id="6" name="Rectangle 5">
+            <a:extLst>
+              <a:ext uri="{FF2B5EF4-FFF2-40B4-BE49-F238E27FC236}">
+                <a16:creationId xmlns:a16="http://schemas.microsoft.com/office/drawing/2014/main" id="{F2E026E7-2DC8-B558-93B4-E4B15CD3AFF6}"/>
+              </a:ext>
+            </a:extLst>
+          </p:cNvPr>
+          <p:cNvSpPr/>
+          <p:nvPr/>
+        </p:nvSpPr>
+        <p:spPr>
+          <a:xfrm>
+            <a:off x="1248770" y="4908646"/>
+            <a:ext cx="2597624" cy="1543334"/>
+          </a:xfrm>
+          <a:prstGeom prst="rect">
+            <a:avLst/>
+          </a:prstGeom>
+        </p:spPr>
+        <p:style>
+          <a:lnRef idx="2">
+            <a:schemeClr val="accent1">
+              <a:shade val="50000"/>
+            </a:schemeClr>
+          </a:lnRef>
+          <a:fillRef idx="1">
+            <a:schemeClr val="accent1"/>
+          </a:fillRef>
+          <a:effectRef idx="0">
+            <a:schemeClr val="accent1"/>
+          </a:effectRef>
+          <a:fontRef idx="minor">
+            <a:schemeClr val="lt1"/>
+          </a:fontRef>
+        </p:style>
+        <p:txBody>
+          <a:bodyPr rtlCol="0" anchor="t"/>
+          <a:lstStyle/>
+          <a:p>
+            <a:r>
+              <a:rPr lang="en-US" dirty="0"/>
+              <a:t>Products</a:t>
+            </a:r>
+          </a:p>
+          <a:p>
+            <a:pPr marL="285750" indent="-285750">
+              <a:buFontTx/>
+              <a:buChar char="-"/>
+            </a:pPr>
+            <a:r>
+              <a:rPr lang="en-US" dirty="0" err="1"/>
+              <a:t>ProductId</a:t>
+            </a:r>
+            <a:endParaRPr lang="en-US" dirty="0"/>
+          </a:p>
+          <a:p>
+            <a:pPr marL="285750" indent="-285750">
+              <a:buFontTx/>
+              <a:buChar char="-"/>
+            </a:pPr>
+            <a:r>
+              <a:rPr lang="en-US" dirty="0"/>
+              <a:t>Price</a:t>
+            </a:r>
+          </a:p>
+          <a:p>
+            <a:pPr marL="285750" indent="-285750">
+              <a:buFontTx/>
+              <a:buChar char="-"/>
+            </a:pPr>
+            <a:r>
+              <a:rPr lang="en-US" dirty="0"/>
+              <a:t>Description</a:t>
+            </a:r>
+          </a:p>
+          <a:p>
+            <a:pPr marL="285750" indent="-285750">
+              <a:buFontTx/>
+              <a:buChar char="-"/>
+            </a:pPr>
+            <a:r>
+              <a:rPr lang="en-US" dirty="0"/>
+              <a:t>Name</a:t>
+            </a:r>
+          </a:p>
+          <a:p>
+            <a:pPr marL="285750" indent="-285750">
+              <a:buFontTx/>
+              <a:buChar char="-"/>
+            </a:pPr>
+            <a:endParaRPr lang="en-US" dirty="0"/>
+          </a:p>
+          <a:p>
+            <a:pPr marL="285750" indent="-285750">
+              <a:buFontTx/>
+              <a:buChar char="-"/>
+            </a:pPr>
+            <a:endParaRPr lang="en-US" dirty="0"/>
+          </a:p>
+        </p:txBody>
+      </p:sp>
+      <p:sp>
+        <p:nvSpPr>
+          <p:cNvPr id="7" name="Rectangle 6">
+            <a:extLst>
+              <a:ext uri="{FF2B5EF4-FFF2-40B4-BE49-F238E27FC236}">
+                <a16:creationId xmlns:a16="http://schemas.microsoft.com/office/drawing/2014/main" id="{2111A2DE-FE5E-66B8-2EC8-768B7DE4488E}"/>
+              </a:ext>
+            </a:extLst>
+          </p:cNvPr>
+          <p:cNvSpPr/>
+          <p:nvPr/>
+        </p:nvSpPr>
+        <p:spPr>
+          <a:xfrm>
+            <a:off x="4985982" y="1301087"/>
+            <a:ext cx="3580263" cy="2820537"/>
+          </a:xfrm>
+          <a:prstGeom prst="rect">
+            <a:avLst/>
+          </a:prstGeom>
+        </p:spPr>
+        <p:style>
+          <a:lnRef idx="2">
+            <a:schemeClr val="accent1">
+              <a:shade val="50000"/>
+            </a:schemeClr>
+          </a:lnRef>
+          <a:fillRef idx="1">
+            <a:schemeClr val="accent1"/>
+          </a:fillRef>
+          <a:effectRef idx="0">
+            <a:schemeClr val="accent1"/>
+          </a:effectRef>
+          <a:fontRef idx="minor">
+            <a:schemeClr val="lt1"/>
+          </a:fontRef>
+        </p:style>
+        <p:txBody>
+          <a:bodyPr rtlCol="0" anchor="t"/>
+          <a:lstStyle/>
+          <a:p>
+            <a:r>
+              <a:rPr lang="en-US" dirty="0"/>
+              <a:t>Order</a:t>
+            </a:r>
+          </a:p>
+          <a:p>
+            <a:pPr marL="285750" indent="-285750">
+              <a:buFontTx/>
+              <a:buChar char="-"/>
+            </a:pPr>
+            <a:r>
+              <a:rPr lang="en-US" dirty="0" err="1"/>
+              <a:t>OrderPrimary</a:t>
+            </a:r>
+            <a:r>
+              <a:rPr lang="en-US" dirty="0"/>
+              <a:t>(PK)</a:t>
+            </a:r>
+          </a:p>
+          <a:p>
+            <a:pPr marL="285750" indent="-285750">
+              <a:buFontTx/>
+              <a:buChar char="-"/>
+            </a:pPr>
+            <a:r>
+              <a:rPr lang="en-US" dirty="0"/>
+              <a:t>Order time(Datetime)</a:t>
+            </a:r>
+          </a:p>
+          <a:p>
+            <a:pPr marL="285750" indent="-285750">
+              <a:buFontTx/>
+              <a:buChar char="-"/>
+            </a:pPr>
+            <a:r>
+              <a:rPr lang="en-US" dirty="0" err="1"/>
+              <a:t>OrderId</a:t>
+            </a:r>
+            <a:r>
+              <a:rPr lang="en-US" dirty="0"/>
+              <a:t> (</a:t>
+            </a:r>
+            <a:r>
+              <a:rPr lang="en-US" dirty="0" err="1"/>
+              <a:t>Guid</a:t>
+            </a:r>
+            <a:r>
+              <a:rPr lang="en-US" dirty="0"/>
+              <a:t>)</a:t>
+            </a:r>
+          </a:p>
+          <a:p>
+            <a:pPr marL="285750" indent="-285750">
+              <a:buFontTx/>
+              <a:buChar char="-"/>
+            </a:pPr>
+            <a:r>
+              <a:rPr lang="en-US" dirty="0"/>
+              <a:t>store(FK)</a:t>
+            </a:r>
+          </a:p>
+          <a:p>
+            <a:pPr marL="285750" indent="-285750">
+              <a:buFontTx/>
+              <a:buChar char="-"/>
+            </a:pPr>
+            <a:r>
+              <a:rPr lang="en-US" dirty="0"/>
+              <a:t>Product(FK)</a:t>
+            </a:r>
+          </a:p>
+          <a:p>
+            <a:pPr marL="285750" indent="-285750">
+              <a:buFontTx/>
+              <a:buChar char="-"/>
+            </a:pPr>
+            <a:r>
+              <a:rPr lang="en-US" dirty="0"/>
+              <a:t>Customer(FK)</a:t>
+            </a:r>
+          </a:p>
+          <a:p>
+            <a:pPr marL="285750" indent="-285750">
+              <a:buFontTx/>
+              <a:buChar char="-"/>
+            </a:pPr>
+            <a:r>
+              <a:rPr lang="en-US" dirty="0"/>
+              <a:t>Quantity of each product</a:t>
+            </a:r>
+          </a:p>
+          <a:p>
+            <a:pPr marL="285750" indent="-285750">
+              <a:buFontTx/>
+              <a:buChar char="-"/>
+            </a:pPr>
+            <a:endParaRPr lang="en-US" dirty="0"/>
+          </a:p>
+        </p:txBody>
+      </p:sp>
+      <p:sp>
+        <p:nvSpPr>
+          <p:cNvPr id="8" name="Rectangle 7">
+            <a:extLst>
+              <a:ext uri="{FF2B5EF4-FFF2-40B4-BE49-F238E27FC236}">
+                <a16:creationId xmlns:a16="http://schemas.microsoft.com/office/drawing/2014/main" id="{A0550D40-F3D3-89F1-EE77-3D45D1AC01B1}"/>
+              </a:ext>
+            </a:extLst>
+          </p:cNvPr>
+          <p:cNvSpPr/>
+          <p:nvPr/>
+        </p:nvSpPr>
+        <p:spPr>
+          <a:xfrm>
+            <a:off x="1157785" y="363940"/>
+            <a:ext cx="2597624" cy="2035793"/>
+          </a:xfrm>
+          <a:prstGeom prst="rect">
+            <a:avLst/>
+          </a:prstGeom>
+        </p:spPr>
+        <p:style>
+          <a:lnRef idx="2">
+            <a:schemeClr val="accent1">
+              <a:shade val="50000"/>
+            </a:schemeClr>
+          </a:lnRef>
+          <a:fillRef idx="1">
+            <a:schemeClr val="accent1"/>
+          </a:fillRef>
+          <a:effectRef idx="0">
+            <a:schemeClr val="accent1"/>
+          </a:effectRef>
+          <a:fontRef idx="minor">
+            <a:schemeClr val="lt1"/>
+          </a:fontRef>
+        </p:style>
+        <p:txBody>
+          <a:bodyPr rtlCol="0" anchor="t"/>
+          <a:lstStyle/>
+          <a:p>
+            <a:r>
+              <a:rPr lang="en-US" dirty="0"/>
+              <a:t>Customer</a:t>
+            </a:r>
+          </a:p>
+          <a:p>
+            <a:pPr marL="285750" indent="-285750">
+              <a:buFontTx/>
+              <a:buChar char="-"/>
+            </a:pPr>
+            <a:r>
+              <a:rPr lang="en-US" dirty="0" err="1"/>
+              <a:t>CustomerId</a:t>
+            </a:r>
+            <a:endParaRPr lang="en-US" dirty="0"/>
+          </a:p>
+          <a:p>
+            <a:pPr marL="285750" indent="-285750">
+              <a:buFontTx/>
+              <a:buChar char="-"/>
+            </a:pPr>
+            <a:r>
+              <a:rPr lang="en-US" dirty="0" err="1"/>
+              <a:t>Fname</a:t>
+            </a:r>
+            <a:endParaRPr lang="en-US" dirty="0"/>
+          </a:p>
+          <a:p>
+            <a:pPr marL="285750" indent="-285750">
+              <a:buFontTx/>
+              <a:buChar char="-"/>
+            </a:pPr>
+            <a:r>
+              <a:rPr lang="en-US" dirty="0" err="1"/>
+              <a:t>Lname</a:t>
+            </a:r>
+            <a:endParaRPr lang="en-US" dirty="0"/>
+          </a:p>
+          <a:p>
+            <a:pPr marL="285750" indent="-285750">
+              <a:buFontTx/>
+              <a:buChar char="-"/>
+            </a:pPr>
+            <a:r>
+              <a:rPr lang="en-US" dirty="0" err="1"/>
+              <a:t>accountCreated</a:t>
+            </a:r>
+            <a:endParaRPr lang="en-US" dirty="0"/>
+          </a:p>
+          <a:p>
+            <a:pPr marL="285750" indent="-285750">
+              <a:buFontTx/>
+              <a:buChar char="-"/>
+            </a:pPr>
+            <a:r>
+              <a:rPr lang="en-US" dirty="0" err="1"/>
+              <a:t>FavStore</a:t>
+            </a:r>
+            <a:r>
+              <a:rPr lang="en-US" dirty="0"/>
+              <a:t>(FK)</a:t>
+            </a:r>
+          </a:p>
+          <a:p>
+            <a:pPr marL="285750" indent="-285750">
+              <a:buFontTx/>
+              <a:buChar char="-"/>
+            </a:pPr>
+            <a:endParaRPr lang="en-US" dirty="0"/>
+          </a:p>
+        </p:txBody>
+      </p:sp>
+      <p:sp>
+        <p:nvSpPr>
+          <p:cNvPr id="9" name="Rectangle 8">
+            <a:extLst>
+              <a:ext uri="{FF2B5EF4-FFF2-40B4-BE49-F238E27FC236}">
+                <a16:creationId xmlns:a16="http://schemas.microsoft.com/office/drawing/2014/main" id="{03EC148E-8C7E-1315-B21E-EB53003B9EB2}"/>
+              </a:ext>
+            </a:extLst>
+          </p:cNvPr>
+          <p:cNvSpPr/>
+          <p:nvPr/>
+        </p:nvSpPr>
+        <p:spPr>
+          <a:xfrm>
+            <a:off x="5345372" y="4988255"/>
+            <a:ext cx="2597624" cy="1303362"/>
+          </a:xfrm>
+          <a:prstGeom prst="rect">
+            <a:avLst/>
+          </a:prstGeom>
+        </p:spPr>
+        <p:style>
+          <a:lnRef idx="2">
+            <a:schemeClr val="accent1">
+              <a:shade val="50000"/>
+            </a:schemeClr>
+          </a:lnRef>
+          <a:fillRef idx="1">
+            <a:schemeClr val="accent1"/>
+          </a:fillRef>
+          <a:effectRef idx="0">
+            <a:schemeClr val="accent1"/>
+          </a:effectRef>
+          <a:fontRef idx="minor">
+            <a:schemeClr val="lt1"/>
+          </a:fontRef>
+        </p:style>
+        <p:txBody>
+          <a:bodyPr rtlCol="0" anchor="t"/>
+          <a:lstStyle/>
+          <a:p>
+            <a:r>
+              <a:rPr lang="en-US" u="sng" dirty="0" err="1"/>
+              <a:t>InventoryJunction</a:t>
+            </a:r>
+            <a:endParaRPr lang="en-US" u="sng" dirty="0"/>
+          </a:p>
+          <a:p>
+            <a:r>
+              <a:rPr lang="en-US" dirty="0"/>
+              <a:t>-store(FK)</a:t>
+            </a:r>
+          </a:p>
+          <a:p>
+            <a:r>
+              <a:rPr lang="en-US" dirty="0"/>
+              <a:t>-Product(FK)</a:t>
+            </a:r>
+          </a:p>
+          <a:p>
+            <a:r>
+              <a:rPr lang="en-US" dirty="0"/>
+              <a:t>-Quantity</a:t>
+            </a:r>
+          </a:p>
+        </p:txBody>
+      </p:sp>
+      <p:cxnSp>
+        <p:nvCxnSpPr>
+          <p:cNvPr id="11" name="Straight Arrow Connector 10">
+            <a:extLst>
+              <a:ext uri="{FF2B5EF4-FFF2-40B4-BE49-F238E27FC236}">
+                <a16:creationId xmlns:a16="http://schemas.microsoft.com/office/drawing/2014/main" id="{B6E2FEAB-BB6C-C53A-0C23-5A84AD8E5A24}"/>
+              </a:ext>
+            </a:extLst>
+          </p:cNvPr>
+          <p:cNvCxnSpPr>
+            <a:cxnSpLocks/>
+            <a:stCxn id="9" idx="1"/>
+            <a:endCxn id="5" idx="3"/>
+          </p:cNvCxnSpPr>
+          <p:nvPr/>
+        </p:nvCxnSpPr>
+        <p:spPr>
+          <a:xfrm flipH="1" flipV="1">
+            <a:off x="3759958" y="3777304"/>
+            <a:ext cx="1585414" cy="1862632"/>
+          </a:xfrm>
+          <a:prstGeom prst="straightConnector1">
+            <a:avLst/>
+          </a:prstGeom>
+          <a:ln>
+            <a:tailEnd type="triangle"/>
+          </a:ln>
+        </p:spPr>
+        <p:style>
+          <a:lnRef idx="1">
+            <a:schemeClr val="accent1"/>
+          </a:lnRef>
+          <a:fillRef idx="0">
+            <a:schemeClr val="accent1"/>
+          </a:fillRef>
+          <a:effectRef idx="0">
+            <a:schemeClr val="accent1"/>
+          </a:effectRef>
+          <a:fontRef idx="minor">
+            <a:schemeClr val="tx1"/>
+          </a:fontRef>
+        </p:style>
+      </p:cxnSp>
+      <p:cxnSp>
+        <p:nvCxnSpPr>
+          <p:cNvPr id="12" name="Straight Arrow Connector 11">
+            <a:extLst>
+              <a:ext uri="{FF2B5EF4-FFF2-40B4-BE49-F238E27FC236}">
+                <a16:creationId xmlns:a16="http://schemas.microsoft.com/office/drawing/2014/main" id="{D97FC046-046E-2B8B-21D9-14DFF060BDBC}"/>
+              </a:ext>
+            </a:extLst>
+          </p:cNvPr>
+          <p:cNvCxnSpPr>
+            <a:cxnSpLocks/>
+            <a:stCxn id="9" idx="1"/>
+            <a:endCxn id="6" idx="3"/>
+          </p:cNvCxnSpPr>
+          <p:nvPr/>
+        </p:nvCxnSpPr>
+        <p:spPr>
+          <a:xfrm flipH="1">
+            <a:off x="3846394" y="5639936"/>
+            <a:ext cx="1498978" cy="40377"/>
+          </a:xfrm>
+          <a:prstGeom prst="straightConnector1">
+            <a:avLst/>
+          </a:prstGeom>
+          <a:ln>
+            <a:tailEnd type="triangle"/>
+          </a:ln>
+        </p:spPr>
+        <p:style>
+          <a:lnRef idx="1">
+            <a:schemeClr val="accent1"/>
+          </a:lnRef>
+          <a:fillRef idx="0">
+            <a:schemeClr val="accent1"/>
+          </a:fillRef>
+          <a:effectRef idx="0">
+            <a:schemeClr val="accent1"/>
+          </a:effectRef>
+          <a:fontRef idx="minor">
+            <a:schemeClr val="tx1"/>
+          </a:fontRef>
+        </p:style>
+      </p:cxnSp>
+      <p:cxnSp>
+        <p:nvCxnSpPr>
+          <p:cNvPr id="15" name="Straight Arrow Connector 14">
+            <a:extLst>
+              <a:ext uri="{FF2B5EF4-FFF2-40B4-BE49-F238E27FC236}">
+                <a16:creationId xmlns:a16="http://schemas.microsoft.com/office/drawing/2014/main" id="{7A05FA8F-5A46-B44D-7C14-8832B12DF63B}"/>
+              </a:ext>
+            </a:extLst>
+          </p:cNvPr>
+          <p:cNvCxnSpPr>
+            <a:cxnSpLocks/>
+            <a:stCxn id="7" idx="1"/>
+            <a:endCxn id="8" idx="3"/>
+          </p:cNvCxnSpPr>
+          <p:nvPr/>
+        </p:nvCxnSpPr>
+        <p:spPr>
+          <a:xfrm flipH="1" flipV="1">
+            <a:off x="3755409" y="1381837"/>
+            <a:ext cx="1230573" cy="1329519"/>
+          </a:xfrm>
+          <a:prstGeom prst="straightConnector1">
+            <a:avLst/>
+          </a:prstGeom>
+          <a:ln>
+            <a:tailEnd type="triangle"/>
+          </a:ln>
+        </p:spPr>
+        <p:style>
+          <a:lnRef idx="1">
+            <a:schemeClr val="accent1"/>
+          </a:lnRef>
+          <a:fillRef idx="0">
+            <a:schemeClr val="accent1"/>
+          </a:fillRef>
+          <a:effectRef idx="0">
+            <a:schemeClr val="accent1"/>
+          </a:effectRef>
+          <a:fontRef idx="minor">
+            <a:schemeClr val="tx1"/>
+          </a:fontRef>
+        </p:style>
+      </p:cxnSp>
+      <p:cxnSp>
+        <p:nvCxnSpPr>
+          <p:cNvPr id="18" name="Straight Arrow Connector 17">
+            <a:extLst>
+              <a:ext uri="{FF2B5EF4-FFF2-40B4-BE49-F238E27FC236}">
+                <a16:creationId xmlns:a16="http://schemas.microsoft.com/office/drawing/2014/main" id="{7C20BD12-7BB8-584C-60E1-4C23661B99CE}"/>
+              </a:ext>
+            </a:extLst>
+          </p:cNvPr>
+          <p:cNvCxnSpPr>
+            <a:cxnSpLocks/>
+            <a:stCxn id="7" idx="1"/>
+            <a:endCxn id="5" idx="3"/>
+          </p:cNvCxnSpPr>
+          <p:nvPr/>
+        </p:nvCxnSpPr>
+        <p:spPr>
+          <a:xfrm flipH="1">
+            <a:off x="3759958" y="2711356"/>
+            <a:ext cx="1226024" cy="1065948"/>
+          </a:xfrm>
+          <a:prstGeom prst="straightConnector1">
+            <a:avLst/>
+          </a:prstGeom>
+          <a:ln>
+            <a:tailEnd type="triangle"/>
+          </a:ln>
+        </p:spPr>
+        <p:style>
+          <a:lnRef idx="1">
+            <a:schemeClr val="accent1"/>
+          </a:lnRef>
+          <a:fillRef idx="0">
+            <a:schemeClr val="accent1"/>
+          </a:fillRef>
+          <a:effectRef idx="0">
+            <a:schemeClr val="accent1"/>
+          </a:effectRef>
+          <a:fontRef idx="minor">
+            <a:schemeClr val="tx1"/>
+          </a:fontRef>
+        </p:style>
+      </p:cxnSp>
+    </p:spTree>
+    <p:extLst>
+      <p:ext uri="{BB962C8B-B14F-4D97-AF65-F5344CB8AC3E}">
+        <p14:creationId xmlns:p14="http://schemas.microsoft.com/office/powerpoint/2010/main" val="2933167212"/>
+      </p:ext>
+    </p:extLst>
+  </p:cSld>
+  <p:clrMapOvr>
+    <a:masterClrMapping/>
+  </p:clrMapOvr>
+</p:sld>
+</file>
+
 <file path=ppt/theme/theme1.xml><?xml version="1.0" encoding="utf-8"?>
 <a:theme xmlns:a="http://schemas.openxmlformats.org/drawingml/2006/main" name="Office Theme">
   <a:themeElements>

</xml_diff>

<commit_message>
adds triggers and a drawring
</commit_message>
<xml_diff>
--- a/Marks Drawrings.pptx
+++ b/Marks Drawrings.pptx
@@ -11,6 +11,7 @@
     <p:sldId id="259" r:id="rId5"/>
     <p:sldId id="260" r:id="rId6"/>
     <p:sldId id="261" r:id="rId7"/>
+    <p:sldId id="262" r:id="rId8"/>
   </p:sldIdLst>
   <p:sldSz cx="12192000" cy="6858000"/>
   <p:notesSz cx="6858000" cy="9144000"/>
@@ -264,7 +265,7 @@
           <a:p>
             <a:fld id="{5D0E3E9C-DB1F-4A1E-AAB4-85CBF81E55B3}" type="datetimeFigureOut">
               <a:rPr lang="en-US" smtClean="0"/>
-              <a:t>5/17/2023</a:t>
+              <a:t>5/19/2023</a:t>
             </a:fld>
             <a:endParaRPr lang="en-US"/>
           </a:p>
@@ -462,7 +463,7 @@
           <a:p>
             <a:fld id="{5D0E3E9C-DB1F-4A1E-AAB4-85CBF81E55B3}" type="datetimeFigureOut">
               <a:rPr lang="en-US" smtClean="0"/>
-              <a:t>5/17/2023</a:t>
+              <a:t>5/19/2023</a:t>
             </a:fld>
             <a:endParaRPr lang="en-US"/>
           </a:p>
@@ -670,7 +671,7 @@
           <a:p>
             <a:fld id="{5D0E3E9C-DB1F-4A1E-AAB4-85CBF81E55B3}" type="datetimeFigureOut">
               <a:rPr lang="en-US" smtClean="0"/>
-              <a:t>5/17/2023</a:t>
+              <a:t>5/19/2023</a:t>
             </a:fld>
             <a:endParaRPr lang="en-US"/>
           </a:p>
@@ -868,7 +869,7 @@
           <a:p>
             <a:fld id="{5D0E3E9C-DB1F-4A1E-AAB4-85CBF81E55B3}" type="datetimeFigureOut">
               <a:rPr lang="en-US" smtClean="0"/>
-              <a:t>5/17/2023</a:t>
+              <a:t>5/19/2023</a:t>
             </a:fld>
             <a:endParaRPr lang="en-US"/>
           </a:p>
@@ -1143,7 +1144,7 @@
           <a:p>
             <a:fld id="{5D0E3E9C-DB1F-4A1E-AAB4-85CBF81E55B3}" type="datetimeFigureOut">
               <a:rPr lang="en-US" smtClean="0"/>
-              <a:t>5/17/2023</a:t>
+              <a:t>5/19/2023</a:t>
             </a:fld>
             <a:endParaRPr lang="en-US"/>
           </a:p>
@@ -1408,7 +1409,7 @@
           <a:p>
             <a:fld id="{5D0E3E9C-DB1F-4A1E-AAB4-85CBF81E55B3}" type="datetimeFigureOut">
               <a:rPr lang="en-US" smtClean="0"/>
-              <a:t>5/17/2023</a:t>
+              <a:t>5/19/2023</a:t>
             </a:fld>
             <a:endParaRPr lang="en-US"/>
           </a:p>
@@ -1820,7 +1821,7 @@
           <a:p>
             <a:fld id="{5D0E3E9C-DB1F-4A1E-AAB4-85CBF81E55B3}" type="datetimeFigureOut">
               <a:rPr lang="en-US" smtClean="0"/>
-              <a:t>5/17/2023</a:t>
+              <a:t>5/19/2023</a:t>
             </a:fld>
             <a:endParaRPr lang="en-US"/>
           </a:p>
@@ -1961,7 +1962,7 @@
           <a:p>
             <a:fld id="{5D0E3E9C-DB1F-4A1E-AAB4-85CBF81E55B3}" type="datetimeFigureOut">
               <a:rPr lang="en-US" smtClean="0"/>
-              <a:t>5/17/2023</a:t>
+              <a:t>5/19/2023</a:t>
             </a:fld>
             <a:endParaRPr lang="en-US"/>
           </a:p>
@@ -2074,7 +2075,7 @@
           <a:p>
             <a:fld id="{5D0E3E9C-DB1F-4A1E-AAB4-85CBF81E55B3}" type="datetimeFigureOut">
               <a:rPr lang="en-US" smtClean="0"/>
-              <a:t>5/17/2023</a:t>
+              <a:t>5/19/2023</a:t>
             </a:fld>
             <a:endParaRPr lang="en-US"/>
           </a:p>
@@ -2385,7 +2386,7 @@
           <a:p>
             <a:fld id="{5D0E3E9C-DB1F-4A1E-AAB4-85CBF81E55B3}" type="datetimeFigureOut">
               <a:rPr lang="en-US" smtClean="0"/>
-              <a:t>5/17/2023</a:t>
+              <a:t>5/19/2023</a:t>
             </a:fld>
             <a:endParaRPr lang="en-US"/>
           </a:p>
@@ -2673,7 +2674,7 @@
           <a:p>
             <a:fld id="{5D0E3E9C-DB1F-4A1E-AAB4-85CBF81E55B3}" type="datetimeFigureOut">
               <a:rPr lang="en-US" smtClean="0"/>
-              <a:t>5/17/2023</a:t>
+              <a:t>5/19/2023</a:t>
             </a:fld>
             <a:endParaRPr lang="en-US"/>
           </a:p>
@@ -2914,7 +2915,7 @@
           <a:p>
             <a:fld id="{5D0E3E9C-DB1F-4A1E-AAB4-85CBF81E55B3}" type="datetimeFigureOut">
               <a:rPr lang="en-US" smtClean="0"/>
-              <a:t>5/17/2023</a:t>
+              <a:t>5/19/2023</a:t>
             </a:fld>
             <a:endParaRPr lang="en-US"/>
           </a:p>
@@ -6740,6 +6741,524 @@
 </p:sld>
 </file>
 
+<file path=ppt/slides/slide7.xml><?xml version="1.0" encoding="utf-8"?>
+<p:sld xmlns:a="http://schemas.openxmlformats.org/drawingml/2006/main" xmlns:r="http://schemas.openxmlformats.org/officeDocument/2006/relationships" xmlns:p="http://schemas.openxmlformats.org/presentationml/2006/main">
+  <p:cSld>
+    <p:spTree>
+      <p:nvGrpSpPr>
+        <p:cNvPr id="1" name=""/>
+        <p:cNvGrpSpPr/>
+        <p:nvPr/>
+      </p:nvGrpSpPr>
+      <p:grpSpPr>
+        <a:xfrm>
+          <a:off x="0" y="0"/>
+          <a:ext cx="0" cy="0"/>
+          <a:chOff x="0" y="0"/>
+          <a:chExt cx="0" cy="0"/>
+        </a:xfrm>
+      </p:grpSpPr>
+      <p:sp>
+        <p:nvSpPr>
+          <p:cNvPr id="2" name="Title 1">
+            <a:extLst>
+              <a:ext uri="{FF2B5EF4-FFF2-40B4-BE49-F238E27FC236}">
+                <a16:creationId xmlns:a16="http://schemas.microsoft.com/office/drawing/2014/main" id="{EE34DD82-A658-B0A1-6A3F-6335A1815C6D}"/>
+              </a:ext>
+            </a:extLst>
+          </p:cNvPr>
+          <p:cNvSpPr>
+            <a:spLocks noGrp="1"/>
+          </p:cNvSpPr>
+          <p:nvPr>
+            <p:ph type="title"/>
+          </p:nvPr>
+        </p:nvSpPr>
+        <p:spPr/>
+        <p:txBody>
+          <a:bodyPr/>
+          <a:lstStyle/>
+          <a:p>
+            <a:r>
+              <a:rPr lang="en-US" dirty="0"/>
+              <a:t>Marks sample Db structure</a:t>
+            </a:r>
+          </a:p>
+        </p:txBody>
+      </p:sp>
+      <p:sp>
+        <p:nvSpPr>
+          <p:cNvPr id="4" name="Rectangle 3">
+            <a:extLst>
+              <a:ext uri="{FF2B5EF4-FFF2-40B4-BE49-F238E27FC236}">
+                <a16:creationId xmlns:a16="http://schemas.microsoft.com/office/drawing/2014/main" id="{A2AAB452-5551-275B-EBA9-C9B14E9BD818}"/>
+              </a:ext>
+            </a:extLst>
+          </p:cNvPr>
+          <p:cNvSpPr/>
+          <p:nvPr/>
+        </p:nvSpPr>
+        <p:spPr>
+          <a:xfrm>
+            <a:off x="7606803" y="1675363"/>
+            <a:ext cx="3667391" cy="1690874"/>
+          </a:xfrm>
+          <a:prstGeom prst="rect">
+            <a:avLst/>
+          </a:prstGeom>
+        </p:spPr>
+        <p:style>
+          <a:lnRef idx="2">
+            <a:schemeClr val="accent1">
+              <a:shade val="50000"/>
+            </a:schemeClr>
+          </a:lnRef>
+          <a:fillRef idx="1">
+            <a:schemeClr val="accent1"/>
+          </a:fillRef>
+          <a:effectRef idx="0">
+            <a:schemeClr val="accent1"/>
+          </a:effectRef>
+          <a:fontRef idx="minor">
+            <a:schemeClr val="lt1"/>
+          </a:fontRef>
+        </p:style>
+        <p:txBody>
+          <a:bodyPr rtlCol="0" anchor="ctr"/>
+          <a:lstStyle/>
+          <a:p>
+            <a:pPr algn="ctr"/>
+            <a:r>
+              <a:rPr lang="en-US" b="0" dirty="0" err="1">
+                <a:solidFill>
+                  <a:srgbClr val="DCDCAA"/>
+                </a:solidFill>
+                <a:effectLst/>
+                <a:latin typeface="Consolas" panose="020B0609020204030204" pitchFamily="49" charset="0"/>
+              </a:rPr>
+              <a:t>Customer_audits</a:t>
+            </a:r>
+            <a:r>
+              <a:rPr lang="en-US" b="0" dirty="0">
+                <a:solidFill>
+                  <a:srgbClr val="DCDCAA"/>
+                </a:solidFill>
+                <a:effectLst/>
+                <a:latin typeface="Consolas" panose="020B0609020204030204" pitchFamily="49" charset="0"/>
+              </a:rPr>
+              <a:t> Table</a:t>
+            </a:r>
+          </a:p>
+          <a:p>
+            <a:pPr algn="ctr"/>
+            <a:r>
+              <a:rPr lang="en-US" dirty="0">
+                <a:solidFill>
+                  <a:srgbClr val="DCDCAA"/>
+                </a:solidFill>
+                <a:latin typeface="Consolas" panose="020B0609020204030204" pitchFamily="49" charset="0"/>
+              </a:rPr>
+              <a:t>The inserted/deleted entity will be saved here for some business purpose.</a:t>
+            </a:r>
+            <a:endParaRPr lang="en-US" b="0" dirty="0">
+              <a:solidFill>
+                <a:srgbClr val="D4D4D4"/>
+              </a:solidFill>
+              <a:effectLst/>
+              <a:latin typeface="Consolas" panose="020B0609020204030204" pitchFamily="49" charset="0"/>
+            </a:endParaRPr>
+          </a:p>
+          <a:p>
+            <a:pPr algn="ctr"/>
+            <a:endParaRPr lang="en-US" dirty="0"/>
+          </a:p>
+        </p:txBody>
+      </p:sp>
+      <p:sp>
+        <p:nvSpPr>
+          <p:cNvPr id="5" name="Rectangle 4">
+            <a:extLst>
+              <a:ext uri="{FF2B5EF4-FFF2-40B4-BE49-F238E27FC236}">
+                <a16:creationId xmlns:a16="http://schemas.microsoft.com/office/drawing/2014/main" id="{F907058C-8FA4-E7DF-3EC0-BFAC36965675}"/>
+              </a:ext>
+            </a:extLst>
+          </p:cNvPr>
+          <p:cNvSpPr/>
+          <p:nvPr/>
+        </p:nvSpPr>
+        <p:spPr>
+          <a:xfrm>
+            <a:off x="1005817" y="3665200"/>
+            <a:ext cx="2626559" cy="1690874"/>
+          </a:xfrm>
+          <a:prstGeom prst="rect">
+            <a:avLst/>
+          </a:prstGeom>
+        </p:spPr>
+        <p:style>
+          <a:lnRef idx="2">
+            <a:schemeClr val="accent1">
+              <a:shade val="50000"/>
+            </a:schemeClr>
+          </a:lnRef>
+          <a:fillRef idx="1">
+            <a:schemeClr val="accent1"/>
+          </a:fillRef>
+          <a:effectRef idx="0">
+            <a:schemeClr val="accent1"/>
+          </a:effectRef>
+          <a:fontRef idx="minor">
+            <a:schemeClr val="lt1"/>
+          </a:fontRef>
+        </p:style>
+        <p:txBody>
+          <a:bodyPr rtlCol="0" anchor="ctr"/>
+          <a:lstStyle/>
+          <a:p>
+            <a:pPr algn="ctr"/>
+            <a:r>
+              <a:rPr lang="en-US" b="0" dirty="0">
+                <a:solidFill>
+                  <a:srgbClr val="DCDCAA"/>
+                </a:solidFill>
+                <a:effectLst/>
+                <a:latin typeface="Consolas" panose="020B0609020204030204" pitchFamily="49" charset="0"/>
+              </a:rPr>
+              <a:t>Customers Table</a:t>
+            </a:r>
+          </a:p>
+          <a:p>
+            <a:pPr algn="ctr"/>
+            <a:r>
+              <a:rPr lang="en-US" dirty="0">
+                <a:solidFill>
+                  <a:srgbClr val="DCDCAA"/>
+                </a:solidFill>
+                <a:latin typeface="Consolas" panose="020B0609020204030204" pitchFamily="49" charset="0"/>
+              </a:rPr>
+              <a:t>This holds the customers.</a:t>
+            </a:r>
+            <a:endParaRPr lang="en-US" b="0" dirty="0">
+              <a:solidFill>
+                <a:srgbClr val="D4D4D4"/>
+              </a:solidFill>
+              <a:effectLst/>
+              <a:latin typeface="Consolas" panose="020B0609020204030204" pitchFamily="49" charset="0"/>
+            </a:endParaRPr>
+          </a:p>
+          <a:p>
+            <a:pPr algn="ctr"/>
+            <a:endParaRPr lang="en-US" dirty="0"/>
+          </a:p>
+        </p:txBody>
+      </p:sp>
+      <p:sp>
+        <p:nvSpPr>
+          <p:cNvPr id="7" name="Rectangle: Top Corners Snipped 6">
+            <a:extLst>
+              <a:ext uri="{FF2B5EF4-FFF2-40B4-BE49-F238E27FC236}">
+                <a16:creationId xmlns:a16="http://schemas.microsoft.com/office/drawing/2014/main" id="{3E3A10A1-9839-BA89-F21D-3C4D36429A2B}"/>
+              </a:ext>
+            </a:extLst>
+          </p:cNvPr>
+          <p:cNvSpPr/>
+          <p:nvPr/>
+        </p:nvSpPr>
+        <p:spPr>
+          <a:xfrm>
+            <a:off x="4069834" y="2428910"/>
+            <a:ext cx="3182521" cy="2472580"/>
+          </a:xfrm>
+          <a:prstGeom prst="snip2SameRect">
+            <a:avLst/>
+          </a:prstGeom>
+        </p:spPr>
+        <p:style>
+          <a:lnRef idx="2">
+            <a:schemeClr val="accent1">
+              <a:shade val="50000"/>
+            </a:schemeClr>
+          </a:lnRef>
+          <a:fillRef idx="1">
+            <a:schemeClr val="accent1"/>
+          </a:fillRef>
+          <a:effectRef idx="0">
+            <a:schemeClr val="accent1"/>
+          </a:effectRef>
+          <a:fontRef idx="minor">
+            <a:schemeClr val="lt1"/>
+          </a:fontRef>
+        </p:style>
+        <p:txBody>
+          <a:bodyPr rtlCol="0" anchor="ctr"/>
+          <a:lstStyle/>
+          <a:p>
+            <a:pPr algn="ctr"/>
+            <a:r>
+              <a:rPr lang="en-US" b="0" dirty="0" err="1">
+                <a:solidFill>
+                  <a:srgbClr val="DCDCAA"/>
+                </a:solidFill>
+                <a:effectLst/>
+                <a:latin typeface="Consolas" panose="020B0609020204030204" pitchFamily="49" charset="0"/>
+              </a:rPr>
+              <a:t>WhenCustomerAdded</a:t>
+            </a:r>
+            <a:endParaRPr lang="en-US" b="0" dirty="0">
+              <a:solidFill>
+                <a:srgbClr val="D4D4D4"/>
+              </a:solidFill>
+              <a:effectLst/>
+              <a:latin typeface="Consolas" panose="020B0609020204030204" pitchFamily="49" charset="0"/>
+            </a:endParaRPr>
+          </a:p>
+          <a:p>
+            <a:pPr algn="ctr"/>
+            <a:r>
+              <a:rPr lang="en-US" dirty="0"/>
+              <a:t> After INSERT or DELETE</a:t>
+            </a:r>
+          </a:p>
+          <a:p>
+            <a:pPr algn="ctr"/>
+            <a:r>
+              <a:rPr lang="en-US" dirty="0"/>
+              <a:t>Trigger</a:t>
+            </a:r>
+          </a:p>
+        </p:txBody>
+      </p:sp>
+      <p:sp>
+        <p:nvSpPr>
+          <p:cNvPr id="8" name="Oval 7">
+            <a:extLst>
+              <a:ext uri="{FF2B5EF4-FFF2-40B4-BE49-F238E27FC236}">
+                <a16:creationId xmlns:a16="http://schemas.microsoft.com/office/drawing/2014/main" id="{A3B838A1-6FB4-D14E-4A6C-542D77E97E7D}"/>
+              </a:ext>
+            </a:extLst>
+          </p:cNvPr>
+          <p:cNvSpPr/>
+          <p:nvPr/>
+        </p:nvSpPr>
+        <p:spPr>
+          <a:xfrm>
+            <a:off x="1094788" y="2197881"/>
+            <a:ext cx="2620599" cy="1598923"/>
+          </a:xfrm>
+          <a:prstGeom prst="ellipse">
+            <a:avLst/>
+          </a:prstGeom>
+        </p:spPr>
+        <p:style>
+          <a:lnRef idx="2">
+            <a:schemeClr val="accent1">
+              <a:shade val="50000"/>
+            </a:schemeClr>
+          </a:lnRef>
+          <a:fillRef idx="1">
+            <a:schemeClr val="accent1"/>
+          </a:fillRef>
+          <a:effectRef idx="0">
+            <a:schemeClr val="accent1"/>
+          </a:effectRef>
+          <a:fontRef idx="minor">
+            <a:schemeClr val="lt1"/>
+          </a:fontRef>
+        </p:style>
+        <p:txBody>
+          <a:bodyPr rtlCol="0" anchor="ctr"/>
+          <a:lstStyle/>
+          <a:p>
+            <a:pPr algn="ctr"/>
+            <a:r>
+              <a:rPr lang="en-US" dirty="0"/>
+              <a:t>Insert/delete statement</a:t>
+            </a:r>
+          </a:p>
+        </p:txBody>
+      </p:sp>
+      <p:cxnSp>
+        <p:nvCxnSpPr>
+          <p:cNvPr id="10" name="Straight Arrow Connector 9">
+            <a:extLst>
+              <a:ext uri="{FF2B5EF4-FFF2-40B4-BE49-F238E27FC236}">
+                <a16:creationId xmlns:a16="http://schemas.microsoft.com/office/drawing/2014/main" id="{31B96DD1-526D-2E4A-DAA4-9C0C3DE3FBF4}"/>
+              </a:ext>
+            </a:extLst>
+          </p:cNvPr>
+          <p:cNvCxnSpPr>
+            <a:stCxn id="7" idx="2"/>
+            <a:endCxn id="5" idx="3"/>
+          </p:cNvCxnSpPr>
+          <p:nvPr/>
+        </p:nvCxnSpPr>
+        <p:spPr>
+          <a:xfrm flipH="1">
+            <a:off x="3632376" y="3665200"/>
+            <a:ext cx="437458" cy="845437"/>
+          </a:xfrm>
+          <a:prstGeom prst="straightConnector1">
+            <a:avLst/>
+          </a:prstGeom>
+          <a:ln w="76200">
+            <a:tailEnd type="triangle"/>
+          </a:ln>
+        </p:spPr>
+        <p:style>
+          <a:lnRef idx="1">
+            <a:schemeClr val="accent2"/>
+          </a:lnRef>
+          <a:fillRef idx="0">
+            <a:schemeClr val="accent2"/>
+          </a:fillRef>
+          <a:effectRef idx="0">
+            <a:schemeClr val="accent2"/>
+          </a:effectRef>
+          <a:fontRef idx="minor">
+            <a:schemeClr val="tx1"/>
+          </a:fontRef>
+        </p:style>
+      </p:cxnSp>
+      <p:cxnSp>
+        <p:nvCxnSpPr>
+          <p:cNvPr id="12" name="Connector: Elbow 11">
+            <a:extLst>
+              <a:ext uri="{FF2B5EF4-FFF2-40B4-BE49-F238E27FC236}">
+                <a16:creationId xmlns:a16="http://schemas.microsoft.com/office/drawing/2014/main" id="{03B663D9-6EDE-6CC2-8FD4-931177DD807F}"/>
+              </a:ext>
+            </a:extLst>
+          </p:cNvPr>
+          <p:cNvCxnSpPr>
+            <a:stCxn id="7" idx="1"/>
+            <a:endCxn id="4" idx="2"/>
+          </p:cNvCxnSpPr>
+          <p:nvPr/>
+        </p:nvCxnSpPr>
+        <p:spPr>
+          <a:xfrm rot="5400000" flipH="1" flipV="1">
+            <a:off x="6783170" y="2244162"/>
+            <a:ext cx="1535253" cy="3779404"/>
+          </a:xfrm>
+          <a:prstGeom prst="bentConnector3">
+            <a:avLst>
+              <a:gd name="adj1" fmla="val -14890"/>
+            </a:avLst>
+          </a:prstGeom>
+          <a:ln w="76200">
+            <a:tailEnd type="triangle"/>
+          </a:ln>
+        </p:spPr>
+        <p:style>
+          <a:lnRef idx="1">
+            <a:schemeClr val="accent2"/>
+          </a:lnRef>
+          <a:fillRef idx="0">
+            <a:schemeClr val="accent2"/>
+          </a:fillRef>
+          <a:effectRef idx="0">
+            <a:schemeClr val="accent2"/>
+          </a:effectRef>
+          <a:fontRef idx="minor">
+            <a:schemeClr val="tx1"/>
+          </a:fontRef>
+        </p:style>
+      </p:cxnSp>
+      <p:cxnSp>
+        <p:nvCxnSpPr>
+          <p:cNvPr id="13" name="Straight Arrow Connector 12">
+            <a:extLst>
+              <a:ext uri="{FF2B5EF4-FFF2-40B4-BE49-F238E27FC236}">
+                <a16:creationId xmlns:a16="http://schemas.microsoft.com/office/drawing/2014/main" id="{5356095E-6F8D-D2B5-05C8-CCD13D439264}"/>
+              </a:ext>
+            </a:extLst>
+          </p:cNvPr>
+          <p:cNvCxnSpPr>
+            <a:cxnSpLocks/>
+            <a:stCxn id="5" idx="3"/>
+          </p:cNvCxnSpPr>
+          <p:nvPr/>
+        </p:nvCxnSpPr>
+        <p:spPr>
+          <a:xfrm>
+            <a:off x="3632376" y="4510637"/>
+            <a:ext cx="1869349" cy="158422"/>
+          </a:xfrm>
+          <a:prstGeom prst="straightConnector1">
+            <a:avLst/>
+          </a:prstGeom>
+          <a:ln w="76200">
+            <a:tailEnd type="triangle"/>
+          </a:ln>
+        </p:spPr>
+        <p:style>
+          <a:lnRef idx="1">
+            <a:schemeClr val="accent2"/>
+          </a:lnRef>
+          <a:fillRef idx="0">
+            <a:schemeClr val="accent2"/>
+          </a:fillRef>
+          <a:effectRef idx="0">
+            <a:schemeClr val="accent2"/>
+          </a:effectRef>
+          <a:fontRef idx="minor">
+            <a:schemeClr val="tx1"/>
+          </a:fontRef>
+        </p:style>
+      </p:cxnSp>
+      <p:cxnSp>
+        <p:nvCxnSpPr>
+          <p:cNvPr id="18" name="Straight Arrow Connector 17">
+            <a:extLst>
+              <a:ext uri="{FF2B5EF4-FFF2-40B4-BE49-F238E27FC236}">
+                <a16:creationId xmlns:a16="http://schemas.microsoft.com/office/drawing/2014/main" id="{7B1B7384-AED3-9304-4BE0-68CFD010C564}"/>
+              </a:ext>
+            </a:extLst>
+          </p:cNvPr>
+          <p:cNvCxnSpPr>
+            <a:cxnSpLocks/>
+          </p:cNvCxnSpPr>
+          <p:nvPr/>
+        </p:nvCxnSpPr>
+        <p:spPr>
+          <a:xfrm flipH="1">
+            <a:off x="2259313" y="3281386"/>
+            <a:ext cx="10137" cy="708259"/>
+          </a:xfrm>
+          <a:prstGeom prst="straightConnector1">
+            <a:avLst/>
+          </a:prstGeom>
+          <a:ln w="76200">
+            <a:tailEnd type="triangle"/>
+          </a:ln>
+        </p:spPr>
+        <p:style>
+          <a:lnRef idx="1">
+            <a:schemeClr val="accent2"/>
+          </a:lnRef>
+          <a:fillRef idx="0">
+            <a:schemeClr val="accent2"/>
+          </a:fillRef>
+          <a:effectRef idx="0">
+            <a:schemeClr val="accent2"/>
+          </a:effectRef>
+          <a:fontRef idx="minor">
+            <a:schemeClr val="tx1"/>
+          </a:fontRef>
+        </p:style>
+      </p:cxnSp>
+    </p:spTree>
+    <p:extLst>
+      <p:ext uri="{BB962C8B-B14F-4D97-AF65-F5344CB8AC3E}">
+        <p14:creationId xmlns:p14="http://schemas.microsoft.com/office/powerpoint/2010/main" val="3890483499"/>
+      </p:ext>
+    </p:extLst>
+  </p:cSld>
+  <p:clrMapOvr>
+    <a:masterClrMapping/>
+  </p:clrMapOvr>
+</p:sld>
+</file>
+
 <file path=ppt/theme/theme1.xml><?xml version="1.0" encoding="utf-8"?>
 <a:theme xmlns:a="http://schemas.openxmlformats.org/drawingml/2006/main" name="Office Theme">
   <a:themeElements>

</xml_diff>

<commit_message>
started RpsAPI for Angular later.
</commit_message>
<xml_diff>
--- a/Marks Drawrings.pptx
+++ b/Marks Drawrings.pptx
@@ -265,7 +265,7 @@
           <a:p>
             <a:fld id="{5D0E3E9C-DB1F-4A1E-AAB4-85CBF81E55B3}" type="datetimeFigureOut">
               <a:rPr lang="en-US" smtClean="0"/>
-              <a:t>5/19/2023</a:t>
+              <a:t>5/23/2023</a:t>
             </a:fld>
             <a:endParaRPr lang="en-US"/>
           </a:p>
@@ -463,7 +463,7 @@
           <a:p>
             <a:fld id="{5D0E3E9C-DB1F-4A1E-AAB4-85CBF81E55B3}" type="datetimeFigureOut">
               <a:rPr lang="en-US" smtClean="0"/>
-              <a:t>5/19/2023</a:t>
+              <a:t>5/23/2023</a:t>
             </a:fld>
             <a:endParaRPr lang="en-US"/>
           </a:p>
@@ -671,7 +671,7 @@
           <a:p>
             <a:fld id="{5D0E3E9C-DB1F-4A1E-AAB4-85CBF81E55B3}" type="datetimeFigureOut">
               <a:rPr lang="en-US" smtClean="0"/>
-              <a:t>5/19/2023</a:t>
+              <a:t>5/23/2023</a:t>
             </a:fld>
             <a:endParaRPr lang="en-US"/>
           </a:p>
@@ -869,7 +869,7 @@
           <a:p>
             <a:fld id="{5D0E3E9C-DB1F-4A1E-AAB4-85CBF81E55B3}" type="datetimeFigureOut">
               <a:rPr lang="en-US" smtClean="0"/>
-              <a:t>5/19/2023</a:t>
+              <a:t>5/23/2023</a:t>
             </a:fld>
             <a:endParaRPr lang="en-US"/>
           </a:p>
@@ -1144,7 +1144,7 @@
           <a:p>
             <a:fld id="{5D0E3E9C-DB1F-4A1E-AAB4-85CBF81E55B3}" type="datetimeFigureOut">
               <a:rPr lang="en-US" smtClean="0"/>
-              <a:t>5/19/2023</a:t>
+              <a:t>5/23/2023</a:t>
             </a:fld>
             <a:endParaRPr lang="en-US"/>
           </a:p>
@@ -1409,7 +1409,7 @@
           <a:p>
             <a:fld id="{5D0E3E9C-DB1F-4A1E-AAB4-85CBF81E55B3}" type="datetimeFigureOut">
               <a:rPr lang="en-US" smtClean="0"/>
-              <a:t>5/19/2023</a:t>
+              <a:t>5/23/2023</a:t>
             </a:fld>
             <a:endParaRPr lang="en-US"/>
           </a:p>
@@ -1821,7 +1821,7 @@
           <a:p>
             <a:fld id="{5D0E3E9C-DB1F-4A1E-AAB4-85CBF81E55B3}" type="datetimeFigureOut">
               <a:rPr lang="en-US" smtClean="0"/>
-              <a:t>5/19/2023</a:t>
+              <a:t>5/23/2023</a:t>
             </a:fld>
             <a:endParaRPr lang="en-US"/>
           </a:p>
@@ -1962,7 +1962,7 @@
           <a:p>
             <a:fld id="{5D0E3E9C-DB1F-4A1E-AAB4-85CBF81E55B3}" type="datetimeFigureOut">
               <a:rPr lang="en-US" smtClean="0"/>
-              <a:t>5/19/2023</a:t>
+              <a:t>5/23/2023</a:t>
             </a:fld>
             <a:endParaRPr lang="en-US"/>
           </a:p>
@@ -2075,7 +2075,7 @@
           <a:p>
             <a:fld id="{5D0E3E9C-DB1F-4A1E-AAB4-85CBF81E55B3}" type="datetimeFigureOut">
               <a:rPr lang="en-US" smtClean="0"/>
-              <a:t>5/19/2023</a:t>
+              <a:t>5/23/2023</a:t>
             </a:fld>
             <a:endParaRPr lang="en-US"/>
           </a:p>
@@ -2386,7 +2386,7 @@
           <a:p>
             <a:fld id="{5D0E3E9C-DB1F-4A1E-AAB4-85CBF81E55B3}" type="datetimeFigureOut">
               <a:rPr lang="en-US" smtClean="0"/>
-              <a:t>5/19/2023</a:t>
+              <a:t>5/23/2023</a:t>
             </a:fld>
             <a:endParaRPr lang="en-US"/>
           </a:p>
@@ -2674,7 +2674,7 @@
           <a:p>
             <a:fld id="{5D0E3E9C-DB1F-4A1E-AAB4-85CBF81E55B3}" type="datetimeFigureOut">
               <a:rPr lang="en-US" smtClean="0"/>
-              <a:t>5/19/2023</a:t>
+              <a:t>5/23/2023</a:t>
             </a:fld>
             <a:endParaRPr lang="en-US"/>
           </a:p>
@@ -2915,7 +2915,7 @@
           <a:p>
             <a:fld id="{5D0E3E9C-DB1F-4A1E-AAB4-85CBF81E55B3}" type="datetimeFigureOut">
               <a:rPr lang="en-US" smtClean="0"/>
-              <a:t>5/19/2023</a:t>
+              <a:t>5/23/2023</a:t>
             </a:fld>
             <a:endParaRPr lang="en-US"/>
           </a:p>
@@ -4920,10 +4920,10 @@
       </p:grpSpPr>
       <p:sp>
         <p:nvSpPr>
-          <p:cNvPr id="4" name="Rectangle 3">
-            <a:extLst>
-              <a:ext uri="{FF2B5EF4-FFF2-40B4-BE49-F238E27FC236}">
-                <a16:creationId xmlns:a16="http://schemas.microsoft.com/office/drawing/2014/main" id="{925E0518-0251-36A9-6506-68DD1C329C48}"/>
+          <p:cNvPr id="3" name="Rectangle 2">
+            <a:extLst>
+              <a:ext uri="{FF2B5EF4-FFF2-40B4-BE49-F238E27FC236}">
+                <a16:creationId xmlns:a16="http://schemas.microsoft.com/office/drawing/2014/main" id="{1610D5C0-D333-3F22-1DD7-7E72379574EF}"/>
               </a:ext>
             </a:extLst>
           </p:cNvPr>
@@ -4932,12 +4932,24 @@
         </p:nvSpPr>
         <p:spPr>
           <a:xfrm>
-            <a:off x="1110018" y="987188"/>
+            <a:off x="1106063" y="5782155"/>
             <a:ext cx="2565779" cy="987188"/>
           </a:xfrm>
           <a:prstGeom prst="rect">
             <a:avLst/>
           </a:prstGeom>
+          <a:solidFill>
+            <a:schemeClr val="accent1">
+              <a:alpha val="52000"/>
+            </a:schemeClr>
+          </a:solidFill>
+          <a:ln>
+            <a:solidFill>
+              <a:schemeClr val="accent1">
+                <a:alpha val="41000"/>
+              </a:schemeClr>
+            </a:solidFill>
+          </a:ln>
         </p:spPr>
         <p:style>
           <a:lnRef idx="2">
@@ -4962,17 +4974,17 @@
             <a:pPr algn="ctr"/>
             <a:r>
               <a:rPr lang="en-US" dirty="0"/>
-              <a:t>UI Layer (Console/API)</a:t>
-            </a:r>
-          </a:p>
-        </p:txBody>
-      </p:sp>
-      <p:sp>
-        <p:nvSpPr>
-          <p:cNvPr id="5" name="Rectangle 4">
-            <a:extLst>
-              <a:ext uri="{FF2B5EF4-FFF2-40B4-BE49-F238E27FC236}">
-                <a16:creationId xmlns:a16="http://schemas.microsoft.com/office/drawing/2014/main" id="{EE1EB677-7764-8EC8-0CB1-29FB76F63263}"/>
+              <a:t>DATABASE</a:t>
+            </a:r>
+          </a:p>
+        </p:txBody>
+      </p:sp>
+      <p:sp>
+        <p:nvSpPr>
+          <p:cNvPr id="4" name="Rectangle 3">
+            <a:extLst>
+              <a:ext uri="{FF2B5EF4-FFF2-40B4-BE49-F238E27FC236}">
+                <a16:creationId xmlns:a16="http://schemas.microsoft.com/office/drawing/2014/main" id="{925E0518-0251-36A9-6506-68DD1C329C48}"/>
               </a:ext>
             </a:extLst>
           </p:cNvPr>
@@ -4981,7 +4993,7 @@
         </p:nvSpPr>
         <p:spPr>
           <a:xfrm>
-            <a:off x="1110018" y="2599898"/>
+            <a:off x="1110018" y="987188"/>
             <a:ext cx="2565779" cy="987188"/>
           </a:xfrm>
           <a:prstGeom prst="rect">
@@ -5011,7 +5023,82 @@
             <a:pPr algn="ctr"/>
             <a:r>
               <a:rPr lang="en-US" dirty="0"/>
+              <a:t>UI Layer </a:t>
+            </a:r>
+          </a:p>
+          <a:p>
+            <a:pPr algn="ctr"/>
+            <a:r>
+              <a:rPr lang="en-US" dirty="0"/>
+              <a:t>(Console App/API) </a:t>
+            </a:r>
+          </a:p>
+          <a:p>
+            <a:pPr algn="ctr"/>
+            <a:r>
+              <a:rPr lang="en-US" dirty="0"/>
+              <a:t>App </a:t>
+            </a:r>
+            <a:r>
+              <a:rPr lang="en-US" dirty="0" err="1"/>
+              <a:t>entryPoint</a:t>
+            </a:r>
+            <a:endParaRPr lang="en-US" dirty="0"/>
+          </a:p>
+        </p:txBody>
+      </p:sp>
+      <p:sp>
+        <p:nvSpPr>
+          <p:cNvPr id="5" name="Rectangle 4">
+            <a:extLst>
+              <a:ext uri="{FF2B5EF4-FFF2-40B4-BE49-F238E27FC236}">
+                <a16:creationId xmlns:a16="http://schemas.microsoft.com/office/drawing/2014/main" id="{EE1EB677-7764-8EC8-0CB1-29FB76F63263}"/>
+              </a:ext>
+            </a:extLst>
+          </p:cNvPr>
+          <p:cNvSpPr/>
+          <p:nvPr/>
+        </p:nvSpPr>
+        <p:spPr>
+          <a:xfrm>
+            <a:off x="1110018" y="2599898"/>
+            <a:ext cx="2565779" cy="987188"/>
+          </a:xfrm>
+          <a:prstGeom prst="rect">
+            <a:avLst/>
+          </a:prstGeom>
+        </p:spPr>
+        <p:style>
+          <a:lnRef idx="2">
+            <a:schemeClr val="accent1">
+              <a:shade val="50000"/>
+            </a:schemeClr>
+          </a:lnRef>
+          <a:fillRef idx="1">
+            <a:schemeClr val="accent1"/>
+          </a:fillRef>
+          <a:effectRef idx="0">
+            <a:schemeClr val="accent1"/>
+          </a:effectRef>
+          <a:fontRef idx="minor">
+            <a:schemeClr val="lt1"/>
+          </a:fontRef>
+        </p:style>
+        <p:txBody>
+          <a:bodyPr rtlCol="0" anchor="ctr"/>
+          <a:lstStyle/>
+          <a:p>
+            <a:pPr algn="ctr"/>
+            <a:r>
+              <a:rPr lang="en-US" dirty="0"/>
               <a:t>Business Layer</a:t>
+            </a:r>
+          </a:p>
+          <a:p>
+            <a:pPr algn="ctr"/>
+            <a:r>
+              <a:rPr lang="en-US" dirty="0"/>
+              <a:t>Class Library</a:t>
             </a:r>
           </a:p>
         </p:txBody>
@@ -5105,7 +5192,14 @@
             <a:pPr algn="ctr"/>
             <a:r>
               <a:rPr lang="en-US" dirty="0"/>
-              <a:t>Repo Layer </a:t>
+              <a:t>Repo Layer</a:t>
+            </a:r>
+          </a:p>
+          <a:p>
+            <a:pPr algn="ctr"/>
+            <a:r>
+              <a:rPr lang="en-US" dirty="0"/>
+              <a:t>Class Library </a:t>
             </a:r>
           </a:p>
           <a:p>
@@ -5380,7 +5474,7 @@
         </p:nvSpPr>
         <p:spPr>
           <a:xfrm>
-            <a:off x="5519941" y="1974376"/>
+            <a:off x="5792896" y="1959591"/>
             <a:ext cx="2565779" cy="987188"/>
           </a:xfrm>
           <a:prstGeom prst="rect">
@@ -5413,6 +5507,13 @@
               <a:t>Models Layer</a:t>
             </a:r>
           </a:p>
+          <a:p>
+            <a:pPr algn="ctr"/>
+            <a:r>
+              <a:rPr lang="en-US" dirty="0"/>
+              <a:t>Class Library</a:t>
+            </a:r>
+          </a:p>
         </p:txBody>
       </p:sp>
       <p:cxnSp>
@@ -5434,7 +5535,7 @@
         <p:spPr>
           <a:xfrm>
             <a:off x="3675797" y="1480782"/>
-            <a:ext cx="1844144" cy="987188"/>
+            <a:ext cx="2117099" cy="972403"/>
           </a:xfrm>
           <a:prstGeom prst="straightConnector1">
             <a:avLst/>
@@ -5479,8 +5580,8 @@
         </p:nvCxnSpPr>
         <p:spPr>
           <a:xfrm flipV="1">
-            <a:off x="3675797" y="2467970"/>
-            <a:ext cx="1844144" cy="625522"/>
+            <a:off x="3675797" y="2453185"/>
+            <a:ext cx="2117099" cy="640307"/>
           </a:xfrm>
           <a:prstGeom prst="straightConnector1">
             <a:avLst/>
@@ -5525,8 +5626,8 @@
         </p:nvCxnSpPr>
         <p:spPr>
           <a:xfrm flipV="1">
-            <a:off x="3675797" y="2467970"/>
-            <a:ext cx="1844144" cy="2238232"/>
+            <a:off x="3675797" y="2453185"/>
+            <a:ext cx="2117099" cy="2253017"/>
           </a:xfrm>
           <a:prstGeom prst="straightConnector1">
             <a:avLst/>
@@ -5644,6 +5745,205 @@
             <a:r>
               <a:rPr lang="en-US" dirty="0"/>
               <a:t>)</a:t>
+            </a:r>
+          </a:p>
+        </p:txBody>
+      </p:sp>
+      <p:sp>
+        <p:nvSpPr>
+          <p:cNvPr id="2" name="Oval 1">
+            <a:extLst>
+              <a:ext uri="{FF2B5EF4-FFF2-40B4-BE49-F238E27FC236}">
+                <a16:creationId xmlns:a16="http://schemas.microsoft.com/office/drawing/2014/main" id="{B506A02B-6F15-E3B8-CDED-C7BD7459C74C}"/>
+              </a:ext>
+            </a:extLst>
+          </p:cNvPr>
+          <p:cNvSpPr/>
+          <p:nvPr/>
+        </p:nvSpPr>
+        <p:spPr>
+          <a:xfrm>
+            <a:off x="843888" y="6102877"/>
+            <a:ext cx="1032680" cy="345744"/>
+          </a:xfrm>
+          <a:prstGeom prst="ellipse">
+            <a:avLst/>
+          </a:prstGeom>
+        </p:spPr>
+        <p:style>
+          <a:lnRef idx="2">
+            <a:schemeClr val="accent1">
+              <a:shade val="50000"/>
+            </a:schemeClr>
+          </a:lnRef>
+          <a:fillRef idx="1">
+            <a:schemeClr val="accent1"/>
+          </a:fillRef>
+          <a:effectRef idx="0">
+            <a:schemeClr val="accent1"/>
+          </a:effectRef>
+          <a:fontRef idx="minor">
+            <a:schemeClr val="lt1"/>
+          </a:fontRef>
+        </p:style>
+        <p:txBody>
+          <a:bodyPr rtlCol="0" anchor="ctr"/>
+          <a:lstStyle/>
+          <a:p>
+            <a:pPr algn="ctr"/>
+            <a:r>
+              <a:rPr lang="en-US" dirty="0"/>
+              <a:t>Data</a:t>
+            </a:r>
+          </a:p>
+        </p:txBody>
+      </p:sp>
+      <p:cxnSp>
+        <p:nvCxnSpPr>
+          <p:cNvPr id="6" name="Straight Arrow Connector 5">
+            <a:extLst>
+              <a:ext uri="{FF2B5EF4-FFF2-40B4-BE49-F238E27FC236}">
+                <a16:creationId xmlns:a16="http://schemas.microsoft.com/office/drawing/2014/main" id="{84E3EEA1-ADB7-6EFC-A7F3-A840A380EAEB}"/>
+              </a:ext>
+            </a:extLst>
+          </p:cNvPr>
+          <p:cNvCxnSpPr>
+            <a:cxnSpLocks/>
+            <a:stCxn id="8" idx="2"/>
+            <a:endCxn id="3" idx="0"/>
+          </p:cNvCxnSpPr>
+          <p:nvPr/>
+        </p:nvCxnSpPr>
+        <p:spPr>
+          <a:xfrm flipH="1">
+            <a:off x="2388953" y="5199796"/>
+            <a:ext cx="3955" cy="582359"/>
+          </a:xfrm>
+          <a:prstGeom prst="straightConnector1">
+            <a:avLst/>
+          </a:prstGeom>
+          <a:ln w="76200">
+            <a:solidFill>
+              <a:schemeClr val="accent2"/>
+            </a:solidFill>
+            <a:tailEnd type="triangle"/>
+          </a:ln>
+        </p:spPr>
+        <p:style>
+          <a:lnRef idx="1">
+            <a:schemeClr val="accent2"/>
+          </a:lnRef>
+          <a:fillRef idx="0">
+            <a:schemeClr val="accent2"/>
+          </a:fillRef>
+          <a:effectRef idx="0">
+            <a:schemeClr val="accent2"/>
+          </a:effectRef>
+          <a:fontRef idx="minor">
+            <a:schemeClr val="tx1"/>
+          </a:fontRef>
+        </p:style>
+      </p:cxnSp>
+      <p:sp>
+        <p:nvSpPr>
+          <p:cNvPr id="14" name="Oval 13">
+            <a:extLst>
+              <a:ext uri="{FF2B5EF4-FFF2-40B4-BE49-F238E27FC236}">
+                <a16:creationId xmlns:a16="http://schemas.microsoft.com/office/drawing/2014/main" id="{7A0FB736-F2A6-F958-FB53-BC7E20774789}"/>
+              </a:ext>
+            </a:extLst>
+          </p:cNvPr>
+          <p:cNvSpPr/>
+          <p:nvPr/>
+        </p:nvSpPr>
+        <p:spPr>
+          <a:xfrm>
+            <a:off x="2015618" y="137088"/>
+            <a:ext cx="1032680" cy="345744"/>
+          </a:xfrm>
+          <a:prstGeom prst="ellipse">
+            <a:avLst/>
+          </a:prstGeom>
+        </p:spPr>
+        <p:style>
+          <a:lnRef idx="2">
+            <a:schemeClr val="accent1">
+              <a:shade val="50000"/>
+            </a:schemeClr>
+          </a:lnRef>
+          <a:fillRef idx="1">
+            <a:schemeClr val="accent1"/>
+          </a:fillRef>
+          <a:effectRef idx="0">
+            <a:schemeClr val="accent1"/>
+          </a:effectRef>
+          <a:fontRef idx="minor">
+            <a:schemeClr val="lt1"/>
+          </a:fontRef>
+        </p:style>
+        <p:txBody>
+          <a:bodyPr rtlCol="0" anchor="ctr"/>
+          <a:lstStyle/>
+          <a:p>
+            <a:pPr algn="ctr"/>
+            <a:r>
+              <a:rPr lang="en-US" dirty="0"/>
+              <a:t>Data</a:t>
+            </a:r>
+          </a:p>
+        </p:txBody>
+      </p:sp>
+      <p:sp>
+        <p:nvSpPr>
+          <p:cNvPr id="21" name="TextBox 20">
+            <a:extLst>
+              <a:ext uri="{FF2B5EF4-FFF2-40B4-BE49-F238E27FC236}">
+                <a16:creationId xmlns:a16="http://schemas.microsoft.com/office/drawing/2014/main" id="{F14CA715-6393-D006-63FC-1FC74874E8A8}"/>
+              </a:ext>
+            </a:extLst>
+          </p:cNvPr>
+          <p:cNvSpPr txBox="1"/>
+          <p:nvPr/>
+        </p:nvSpPr>
+        <p:spPr>
+          <a:xfrm>
+            <a:off x="3243618" y="1056712"/>
+            <a:ext cx="4653886" cy="369332"/>
+          </a:xfrm>
+          <a:prstGeom prst="rect">
+            <a:avLst/>
+          </a:prstGeom>
+          <a:noFill/>
+        </p:spPr>
+        <p:txBody>
+          <a:bodyPr wrap="square">
+            <a:spAutoFit/>
+          </a:bodyPr>
+          <a:lstStyle/>
+          <a:p>
+            <a:r>
+              <a:rPr lang="en-US" dirty="0">
+                <a:highlight>
+                  <a:srgbClr val="FFFF00"/>
+                </a:highlight>
+              </a:rPr>
+              <a:t>The </a:t>
+            </a:r>
+            <a:r>
+              <a:rPr lang="en-US" dirty="0" err="1">
+                <a:highlight>
+                  <a:srgbClr val="FFFF00"/>
+                </a:highlight>
+              </a:rPr>
+              <a:t>entryPoint</a:t>
+            </a:r>
+            <a:r>
+              <a:rPr lang="en-US" dirty="0">
+                <a:highlight>
+                  <a:srgbClr val="FFFF00"/>
+                </a:highlight>
+              </a:rPr>
+              <a:t> of a .NET API is the controller(s).</a:t>
             </a:r>
           </a:p>
         </p:txBody>

</xml_diff>